<commit_message>
Incluindo a apresentação do dia 12/03
</commit_message>
<xml_diff>
--- a/apresentações/AP20220212.pptx
+++ b/apresentações/AP20220212.pptx
@@ -3928,7 +3928,7 @@
             <a:pPr rtl="0"/>
             <a:fld id="{77C2D03A-16D6-4E5B-8C8D-6FE025A1AAB2}" type="datetime1">
               <a:rPr lang="pt-BR" smtClean="0"/>
-              <a:t>12/02/2022</a:t>
+              <a:t>26/02/2022</a:t>
             </a:fld>
             <a:endParaRPr lang="en-US" dirty="0"/>
           </a:p>
@@ -4098,7 +4098,7 @@
             <a:pPr rtl="0"/>
             <a:fld id="{96E4FC3E-AEF0-4A9D-8F68-B53EC1BD0013}" type="datetime1">
               <a:rPr lang="pt-BR" smtClean="0"/>
-              <a:t>12/02/2022</a:t>
+              <a:t>26/02/2022</a:t>
             </a:fld>
             <a:endParaRPr lang="en-US" dirty="0"/>
           </a:p>
@@ -4866,7 +4866,7 @@
             <a:pPr rtl="0"/>
             <a:fld id="{F328A0E9-176C-4A13-BEE1-B3EF53A90E4F}" type="datetime1">
               <a:rPr lang="pt-BR" smtClean="0"/>
-              <a:t>12/02/2022</a:t>
+              <a:t>26/02/2022</a:t>
             </a:fld>
             <a:endParaRPr lang="en-US" dirty="0"/>
           </a:p>
@@ -5077,7 +5077,7 @@
             <a:pPr rtl="0"/>
             <a:fld id="{25277C4C-EC6B-4BAE-A10E-24FCD85DA88F}" type="datetime1">
               <a:rPr lang="pt-BR" smtClean="0"/>
-              <a:t>12/02/2022</a:t>
+              <a:t>26/02/2022</a:t>
             </a:fld>
             <a:endParaRPr lang="en-US" dirty="0"/>
           </a:p>
@@ -5447,7 +5447,7 @@
             <a:pPr rtl="0"/>
             <a:fld id="{7FDAA554-D28B-4086-A044-761719F9A73B}" type="datetime1">
               <a:rPr lang="pt-BR" smtClean="0"/>
-              <a:t>12/02/2022</a:t>
+              <a:t>26/02/2022</a:t>
             </a:fld>
             <a:endParaRPr lang="en-US" dirty="0"/>
           </a:p>
@@ -5677,7 +5677,7 @@
             <a:pPr rtl="0"/>
             <a:fld id="{808435AE-0E0F-4D16-9805-53AFBC9B041E}" type="datetime1">
               <a:rPr lang="pt-BR" smtClean="0"/>
-              <a:t>12/02/2022</a:t>
+              <a:t>26/02/2022</a:t>
             </a:fld>
             <a:endParaRPr lang="en-US" dirty="0"/>
           </a:p>
@@ -5997,7 +5997,7 @@
             <a:pPr rtl="0"/>
             <a:fld id="{9188617B-6F61-4E1D-82D8-FDC3FA3C7692}" type="datetime1">
               <a:rPr lang="pt-BR" smtClean="0"/>
-              <a:t>12/02/2022</a:t>
+              <a:t>26/02/2022</a:t>
             </a:fld>
             <a:endParaRPr lang="en-US" dirty="0"/>
           </a:p>
@@ -6258,7 +6258,7 @@
             <a:pPr rtl="0"/>
             <a:fld id="{63237813-B0A3-4431-9C44-B25D3B956C2A}" type="datetime1">
               <a:rPr lang="pt-BR" smtClean="0"/>
-              <a:t>12/02/2022</a:t>
+              <a:t>26/02/2022</a:t>
             </a:fld>
             <a:endParaRPr lang="en-US" dirty="0"/>
           </a:p>
@@ -6688,7 +6688,7 @@
             <a:pPr rtl="0"/>
             <a:fld id="{7E5D6801-A05E-42A1-8E5F-C6BF76D91369}" type="datetime1">
               <a:rPr lang="pt-BR" smtClean="0"/>
-              <a:t>12/02/2022</a:t>
+              <a:t>26/02/2022</a:t>
             </a:fld>
             <a:endParaRPr lang="en-US" dirty="0"/>
           </a:p>
@@ -6819,7 +6819,7 @@
             <a:pPr rtl="0"/>
             <a:fld id="{FE889C81-083C-480A-BF0F-8A75A7807E50}" type="datetime1">
               <a:rPr lang="pt-BR" smtClean="0"/>
-              <a:t>12/02/2022</a:t>
+              <a:t>26/02/2022</a:t>
             </a:fld>
             <a:endParaRPr lang="en-US" dirty="0"/>
           </a:p>
@@ -6921,7 +6921,7 @@
             <a:pPr rtl="0"/>
             <a:fld id="{EAAE6F46-37DE-4D88-9157-714F98489685}" type="datetime1">
               <a:rPr lang="pt-BR" smtClean="0"/>
-              <a:t>12/02/2022</a:t>
+              <a:t>26/02/2022</a:t>
             </a:fld>
             <a:endParaRPr lang="en-US" dirty="0"/>
           </a:p>
@@ -7306,7 +7306,7 @@
             <a:pPr rtl="0"/>
             <a:fld id="{DBCB46AA-D730-4F39-8F34-089F4AFE5464}" type="datetime1">
               <a:rPr lang="pt-BR" smtClean="0"/>
-              <a:t>12/02/2022</a:t>
+              <a:t>26/02/2022</a:t>
             </a:fld>
             <a:endParaRPr lang="en-US" dirty="0"/>
           </a:p>
@@ -7608,7 +7608,7 @@
             <a:pPr rtl="0"/>
             <a:fld id="{AA2A628C-807D-4CF9-A851-4DCF010345B1}" type="datetime1">
               <a:rPr lang="pt-BR" smtClean="0"/>
-              <a:t>12/02/2022</a:t>
+              <a:t>26/02/2022</a:t>
             </a:fld>
             <a:endParaRPr lang="en-US" dirty="0"/>
           </a:p>
@@ -7830,7 +7830,7 @@
             <a:pPr rtl="0"/>
             <a:fld id="{1BE2A7FB-858F-437B-BA41-FB3545E10129}" type="datetime1">
               <a:rPr lang="pt-BR" smtClean="0"/>
-              <a:t>12/02/2022</a:t>
+              <a:t>26/02/2022</a:t>
             </a:fld>
             <a:endParaRPr lang="en-US" dirty="0"/>
           </a:p>
@@ -8967,7 +8967,7 @@
             <a:pPr rtl="0"/>
             <a:fld id="{63237813-B0A3-4431-9C44-B25D3B956C2A}" type="datetime1">
               <a:rPr lang="pt-BR" smtClean="0"/>
-              <a:t>12/02/2022</a:t>
+              <a:t>26/02/2022</a:t>
             </a:fld>
             <a:endParaRPr lang="en-US" dirty="0"/>
           </a:p>
@@ -9383,8 +9383,8 @@
           </a:p>
         </p:txBody>
       </p:sp>
-      <mc:AlternateContent xmlns:mc="http://schemas.openxmlformats.org/markup-compatibility/2006">
-        <mc:Choice xmlns:a14="http://schemas.microsoft.com/office/drawing/2010/main" Requires="a14">
+      <mc:AlternateContent xmlns:mc="http://schemas.openxmlformats.org/markup-compatibility/2006" xmlns:a14="http://schemas.microsoft.com/office/drawing/2010/main">
+        <mc:Choice Requires="a14">
           <p:sp>
             <p:nvSpPr>
               <p:cNvPr id="15" name="CaixaDeTexto 14">
@@ -9650,7 +9650,7 @@
             </p:txBody>
           </p:sp>
         </mc:Choice>
-        <mc:Fallback>
+        <mc:Fallback xmlns="">
           <p:sp>
             <p:nvSpPr>
               <p:cNvPr id="15" name="CaixaDeTexto 14">
@@ -10045,8 +10045,8 @@
           </a:p>
         </p:txBody>
       </p:sp>
-      <mc:AlternateContent xmlns:mc="http://schemas.openxmlformats.org/markup-compatibility/2006">
-        <mc:Choice xmlns:a14="http://schemas.microsoft.com/office/drawing/2010/main" Requires="a14">
+      <mc:AlternateContent xmlns:mc="http://schemas.openxmlformats.org/markup-compatibility/2006" xmlns:a14="http://schemas.microsoft.com/office/drawing/2010/main">
+        <mc:Choice Requires="a14">
           <p:sp>
             <p:nvSpPr>
               <p:cNvPr id="18" name="CaixaDeTexto 17">
@@ -11239,7 +11239,7 @@
             </p:txBody>
           </p:sp>
         </mc:Choice>
-        <mc:Fallback>
+        <mc:Fallback xmlns="">
           <p:sp>
             <p:nvSpPr>
               <p:cNvPr id="18" name="CaixaDeTexto 17">
@@ -11499,7 +11499,7 @@
                   <a:spcPts val="600"/>
                 </a:spcAft>
               </a:pPr>
-              <a:t>12/02/2022</a:t>
+              <a:t>26/02/2022</a:t>
             </a:fld>
             <a:endParaRPr lang="en-US"/>
           </a:p>
@@ -12845,7 +12845,7 @@
             <a:pPr rtl="0"/>
             <a:fld id="{63237813-B0A3-4431-9C44-B25D3B956C2A}" type="datetime1">
               <a:rPr lang="pt-BR" smtClean="0"/>
-              <a:t>12/02/2022</a:t>
+              <a:t>26/02/2022</a:t>
             </a:fld>
             <a:endParaRPr lang="en-US" dirty="0"/>
           </a:p>
@@ -12911,8 +12911,8 @@
           </a:p>
         </p:txBody>
       </p:sp>
-      <mc:AlternateContent xmlns:mc="http://schemas.openxmlformats.org/markup-compatibility/2006">
-        <mc:Choice xmlns:a14="http://schemas.microsoft.com/office/drawing/2010/main" Requires="a14">
+      <mc:AlternateContent xmlns:mc="http://schemas.openxmlformats.org/markup-compatibility/2006" xmlns:a14="http://schemas.microsoft.com/office/drawing/2010/main">
+        <mc:Choice Requires="a14">
           <p:sp>
             <p:nvSpPr>
               <p:cNvPr id="10" name="CaixaDeTexto 9">
@@ -12978,6 +12978,7 @@
                 </a:lvl1pPr>
               </a:lstStyle>
               <a:p>
+                <a:pPr/>
                 <a14:m>
                   <m:oMathPara xmlns:m="http://schemas.openxmlformats.org/officeDocument/2006/math">
                     <m:oMathParaPr>
@@ -12985,186 +12986,270 @@
                     </m:oMathParaPr>
                     <m:oMath xmlns:m="http://schemas.openxmlformats.org/officeDocument/2006/math">
                       <m:r>
-                        <a:rPr lang="pt-BR" sz="2400"/>
+                        <a:rPr lang="pt-BR" sz="2400">
+                          <a:latin typeface="Cambria Math" panose="02040503050406030204" pitchFamily="18" charset="0"/>
+                        </a:rPr>
                         <m:t>𝑽</m:t>
                       </m:r>
                       <m:d>
                         <m:dPr>
                           <m:ctrlPr>
-                            <a:rPr lang="pt-BR" sz="2400"/>
+                            <a:rPr lang="pt-BR" sz="2400" i="1">
+                              <a:latin typeface="Cambria Math" panose="02040503050406030204" pitchFamily="18" charset="0"/>
+                            </a:rPr>
                           </m:ctrlPr>
                         </m:dPr>
                         <m:e>
                           <m:r>
-                            <a:rPr lang="pt-BR" sz="2400"/>
+                            <a:rPr lang="pt-BR" sz="2400">
+                              <a:latin typeface="Cambria Math" panose="02040503050406030204" pitchFamily="18" charset="0"/>
+                            </a:rPr>
                             <m:t>𝒓</m:t>
                           </m:r>
                           <m:r>
-                            <a:rPr lang="pt-BR" sz="2400"/>
+                            <a:rPr lang="pt-BR" sz="2400">
+                              <a:latin typeface="Cambria Math" panose="02040503050406030204" pitchFamily="18" charset="0"/>
+                            </a:rPr>
                             <m:t>,</m:t>
                           </m:r>
                           <m:r>
-                            <a:rPr lang="pt-BR" sz="2400"/>
+                            <a:rPr lang="pt-BR" sz="2400">
+                              <a:latin typeface="Cambria Math" panose="02040503050406030204" pitchFamily="18" charset="0"/>
+                            </a:rPr>
                             <m:t>𝑡</m:t>
                           </m:r>
                         </m:e>
                       </m:d>
                       <m:r>
-                        <a:rPr lang="pt-BR" sz="2400"/>
+                        <a:rPr lang="pt-BR" sz="2400">
+                          <a:latin typeface="Cambria Math" panose="02040503050406030204" pitchFamily="18" charset="0"/>
+                        </a:rPr>
                         <m:t>=</m:t>
                       </m:r>
                       <m:r>
-                        <a:rPr lang="pt-BR" sz="2400"/>
+                        <a:rPr lang="pt-BR" sz="2400">
+                          <a:latin typeface="Cambria Math" panose="02040503050406030204" pitchFamily="18" charset="0"/>
+                        </a:rPr>
                         <m:t>𝒊</m:t>
                       </m:r>
                       <m:r>
-                        <a:rPr lang="pt-BR" sz="2400"/>
+                        <a:rPr lang="pt-BR" sz="2400">
+                          <a:latin typeface="Cambria Math" panose="02040503050406030204" pitchFamily="18" charset="0"/>
+                        </a:rPr>
                         <m:t> </m:t>
                       </m:r>
                       <m:r>
-                        <a:rPr lang="pt-BR" sz="2400"/>
+                        <a:rPr lang="pt-BR" sz="2400">
+                          <a:latin typeface="Cambria Math" panose="02040503050406030204" pitchFamily="18" charset="0"/>
+                        </a:rPr>
                         <m:t>𝑢</m:t>
                       </m:r>
                       <m:d>
                         <m:dPr>
                           <m:ctrlPr>
-                            <a:rPr lang="pt-BR" sz="2400"/>
+                            <a:rPr lang="pt-BR" sz="2400" i="1">
+                              <a:latin typeface="Cambria Math" panose="02040503050406030204" pitchFamily="18" charset="0"/>
+                            </a:rPr>
                           </m:ctrlPr>
                         </m:dPr>
                         <m:e>
                           <m:r>
-                            <a:rPr lang="pt-BR" sz="2400"/>
+                            <a:rPr lang="pt-BR" sz="2400">
+                              <a:latin typeface="Cambria Math" panose="02040503050406030204" pitchFamily="18" charset="0"/>
+                            </a:rPr>
                             <m:t>𝑥</m:t>
                           </m:r>
                           <m:r>
-                            <a:rPr lang="pt-BR" sz="2400"/>
+                            <a:rPr lang="pt-BR" sz="2400">
+                              <a:latin typeface="Cambria Math" panose="02040503050406030204" pitchFamily="18" charset="0"/>
+                            </a:rPr>
                             <m:t>,</m:t>
                           </m:r>
                           <m:r>
-                            <a:rPr lang="pt-BR" sz="2400"/>
+                            <a:rPr lang="pt-BR" sz="2400">
+                              <a:latin typeface="Cambria Math" panose="02040503050406030204" pitchFamily="18" charset="0"/>
+                            </a:rPr>
                             <m:t>𝑦</m:t>
                           </m:r>
                           <m:r>
-                            <a:rPr lang="pt-BR" sz="2400"/>
+                            <a:rPr lang="pt-BR" sz="2400">
+                              <a:latin typeface="Cambria Math" panose="02040503050406030204" pitchFamily="18" charset="0"/>
+                            </a:rPr>
                             <m:t>,</m:t>
                           </m:r>
                           <m:r>
-                            <a:rPr lang="pt-BR" sz="2400"/>
+                            <a:rPr lang="pt-BR" sz="2400">
+                              <a:latin typeface="Cambria Math" panose="02040503050406030204" pitchFamily="18" charset="0"/>
+                            </a:rPr>
                             <m:t>𝑧</m:t>
                           </m:r>
                           <m:r>
-                            <a:rPr lang="pt-BR" sz="2400"/>
+                            <a:rPr lang="pt-BR" sz="2400">
+                              <a:latin typeface="Cambria Math" panose="02040503050406030204" pitchFamily="18" charset="0"/>
+                            </a:rPr>
                             <m:t>,</m:t>
                           </m:r>
                           <m:r>
-                            <a:rPr lang="pt-BR" sz="2400"/>
+                            <a:rPr lang="pt-BR" sz="2400">
+                              <a:latin typeface="Cambria Math" panose="02040503050406030204" pitchFamily="18" charset="0"/>
+                            </a:rPr>
                             <m:t>𝑡</m:t>
                           </m:r>
                         </m:e>
                       </m:d>
                       <m:r>
-                        <a:rPr lang="pt-BR" sz="2400"/>
+                        <a:rPr lang="pt-BR" sz="2400">
+                          <a:latin typeface="Cambria Math" panose="02040503050406030204" pitchFamily="18" charset="0"/>
+                        </a:rPr>
                         <m:t>+</m:t>
                       </m:r>
                       <m:r>
-                        <a:rPr lang="pt-BR" sz="2400"/>
+                        <a:rPr lang="pt-BR" sz="2400">
+                          <a:latin typeface="Cambria Math" panose="02040503050406030204" pitchFamily="18" charset="0"/>
+                        </a:rPr>
                         <m:t>𝒋</m:t>
                       </m:r>
                       <m:r>
-                        <a:rPr lang="pt-BR" sz="2400"/>
+                        <a:rPr lang="pt-BR" sz="2400">
+                          <a:latin typeface="Cambria Math" panose="02040503050406030204" pitchFamily="18" charset="0"/>
+                        </a:rPr>
                         <m:t> </m:t>
                       </m:r>
                       <m:r>
-                        <a:rPr lang="pt-BR" sz="2400"/>
+                        <a:rPr lang="pt-BR" sz="2400">
+                          <a:latin typeface="Cambria Math" panose="02040503050406030204" pitchFamily="18" charset="0"/>
+                        </a:rPr>
                         <m:t>𝑣</m:t>
                       </m:r>
                       <m:d>
                         <m:dPr>
                           <m:ctrlPr>
-                            <a:rPr lang="pt-BR" sz="2400"/>
+                            <a:rPr lang="pt-BR" sz="2400" i="1">
+                              <a:latin typeface="Cambria Math" panose="02040503050406030204" pitchFamily="18" charset="0"/>
+                            </a:rPr>
                           </m:ctrlPr>
                         </m:dPr>
                         <m:e>
                           <m:r>
-                            <a:rPr lang="pt-BR" sz="2400"/>
+                            <a:rPr lang="pt-BR" sz="2400">
+                              <a:latin typeface="Cambria Math" panose="02040503050406030204" pitchFamily="18" charset="0"/>
+                            </a:rPr>
                             <m:t>𝑥</m:t>
                           </m:r>
                           <m:r>
-                            <a:rPr lang="pt-BR" sz="2400"/>
+                            <a:rPr lang="pt-BR" sz="2400">
+                              <a:latin typeface="Cambria Math" panose="02040503050406030204" pitchFamily="18" charset="0"/>
+                            </a:rPr>
                             <m:t>,</m:t>
                           </m:r>
                           <m:r>
-                            <a:rPr lang="pt-BR" sz="2400"/>
+                            <a:rPr lang="pt-BR" sz="2400">
+                              <a:latin typeface="Cambria Math" panose="02040503050406030204" pitchFamily="18" charset="0"/>
+                            </a:rPr>
                             <m:t>𝑦</m:t>
                           </m:r>
                           <m:r>
-                            <a:rPr lang="pt-BR" sz="2400"/>
+                            <a:rPr lang="pt-BR" sz="2400">
+                              <a:latin typeface="Cambria Math" panose="02040503050406030204" pitchFamily="18" charset="0"/>
+                            </a:rPr>
                             <m:t>,</m:t>
                           </m:r>
                           <m:r>
-                            <a:rPr lang="pt-BR" sz="2400"/>
+                            <a:rPr lang="pt-BR" sz="2400">
+                              <a:latin typeface="Cambria Math" panose="02040503050406030204" pitchFamily="18" charset="0"/>
+                            </a:rPr>
                             <m:t>𝑧</m:t>
                           </m:r>
                           <m:r>
-                            <a:rPr lang="pt-BR" sz="2400"/>
+                            <a:rPr lang="pt-BR" sz="2400">
+                              <a:latin typeface="Cambria Math" panose="02040503050406030204" pitchFamily="18" charset="0"/>
+                            </a:rPr>
                             <m:t>,</m:t>
                           </m:r>
                           <m:r>
-                            <a:rPr lang="pt-BR" sz="2400"/>
+                            <a:rPr lang="pt-BR" sz="2400">
+                              <a:latin typeface="Cambria Math" panose="02040503050406030204" pitchFamily="18" charset="0"/>
+                            </a:rPr>
                             <m:t>𝑡</m:t>
                           </m:r>
                         </m:e>
                       </m:d>
                       <m:r>
-                        <a:rPr lang="pt-BR" sz="2400"/>
+                        <a:rPr lang="pt-BR" sz="2400">
+                          <a:latin typeface="Cambria Math" panose="02040503050406030204" pitchFamily="18" charset="0"/>
+                        </a:rPr>
                         <m:t>+</m:t>
                       </m:r>
                       <m:r>
-                        <a:rPr lang="pt-BR" sz="2400"/>
+                        <a:rPr lang="pt-BR" sz="2400">
+                          <a:latin typeface="Cambria Math" panose="02040503050406030204" pitchFamily="18" charset="0"/>
+                        </a:rPr>
                         <m:t>𝒌</m:t>
                       </m:r>
                       <m:r>
-                        <a:rPr lang="pt-BR" sz="2400"/>
+                        <a:rPr lang="pt-BR" sz="2400">
+                          <a:latin typeface="Cambria Math" panose="02040503050406030204" pitchFamily="18" charset="0"/>
+                        </a:rPr>
                         <m:t> </m:t>
                       </m:r>
                       <m:r>
-                        <a:rPr lang="pt-BR" sz="2400"/>
+                        <a:rPr lang="pt-BR" sz="2400">
+                          <a:latin typeface="Cambria Math" panose="02040503050406030204" pitchFamily="18" charset="0"/>
+                        </a:rPr>
                         <m:t>𝑤</m:t>
                       </m:r>
                       <m:r>
-                        <a:rPr lang="pt-BR" sz="2400"/>
+                        <a:rPr lang="pt-BR" sz="2400">
+                          <a:latin typeface="Cambria Math" panose="02040503050406030204" pitchFamily="18" charset="0"/>
+                        </a:rPr>
                         <m:t>(</m:t>
                       </m:r>
                       <m:r>
-                        <a:rPr lang="pt-BR" sz="2400"/>
+                        <a:rPr lang="pt-BR" sz="2400">
+                          <a:latin typeface="Cambria Math" panose="02040503050406030204" pitchFamily="18" charset="0"/>
+                        </a:rPr>
                         <m:t>𝑥</m:t>
                       </m:r>
                       <m:r>
-                        <a:rPr lang="pt-BR" sz="2400"/>
+                        <a:rPr lang="pt-BR" sz="2400">
+                          <a:latin typeface="Cambria Math" panose="02040503050406030204" pitchFamily="18" charset="0"/>
+                        </a:rPr>
                         <m:t>,</m:t>
                       </m:r>
                       <m:r>
-                        <a:rPr lang="pt-BR" sz="2400"/>
+                        <a:rPr lang="pt-BR" sz="2400">
+                          <a:latin typeface="Cambria Math" panose="02040503050406030204" pitchFamily="18" charset="0"/>
+                        </a:rPr>
                         <m:t>𝑦</m:t>
                       </m:r>
                       <m:r>
-                        <a:rPr lang="pt-BR" sz="2400"/>
+                        <a:rPr lang="pt-BR" sz="2400">
+                          <a:latin typeface="Cambria Math" panose="02040503050406030204" pitchFamily="18" charset="0"/>
+                        </a:rPr>
                         <m:t>,</m:t>
                       </m:r>
                       <m:r>
-                        <a:rPr lang="pt-BR" sz="2400"/>
+                        <a:rPr lang="pt-BR" sz="2400">
+                          <a:latin typeface="Cambria Math" panose="02040503050406030204" pitchFamily="18" charset="0"/>
+                        </a:rPr>
                         <m:t>𝑧</m:t>
                       </m:r>
                       <m:r>
-                        <a:rPr lang="pt-BR" sz="2400"/>
+                        <a:rPr lang="pt-BR" sz="2400">
+                          <a:latin typeface="Cambria Math" panose="02040503050406030204" pitchFamily="18" charset="0"/>
+                        </a:rPr>
                         <m:t>,</m:t>
                       </m:r>
                       <m:r>
-                        <a:rPr lang="pt-BR" sz="2400"/>
+                        <a:rPr lang="pt-BR" sz="2400">
+                          <a:latin typeface="Cambria Math" panose="02040503050406030204" pitchFamily="18" charset="0"/>
+                        </a:rPr>
                         <m:t>𝑡</m:t>
                       </m:r>
                       <m:r>
-                        <a:rPr lang="pt-BR" sz="2400"/>
+                        <a:rPr lang="pt-BR" sz="2400">
+                          <a:latin typeface="Cambria Math" panose="02040503050406030204" pitchFamily="18" charset="0"/>
+                        </a:rPr>
                         <m:t>) </m:t>
                       </m:r>
                     </m:oMath>
@@ -13175,7 +13260,7 @@
             </p:txBody>
           </p:sp>
         </mc:Choice>
-        <mc:Fallback>
+        <mc:Fallback xmlns="">
           <p:sp>
             <p:nvSpPr>
               <p:cNvPr id="10" name="CaixaDeTexto 9">
@@ -13411,7 +13496,7 @@
             <a:pPr rtl="0"/>
             <a:fld id="{63237813-B0A3-4431-9C44-B25D3B956C2A}" type="datetime1">
               <a:rPr lang="pt-BR" smtClean="0"/>
-              <a:t>12/02/2022</a:t>
+              <a:t>26/02/2022</a:t>
             </a:fld>
             <a:endParaRPr lang="en-US" dirty="0"/>
           </a:p>
@@ -13477,8 +13562,8 @@
           </a:p>
         </p:txBody>
       </p:sp>
-      <mc:AlternateContent xmlns:mc="http://schemas.openxmlformats.org/markup-compatibility/2006">
-        <mc:Choice xmlns:a14="http://schemas.microsoft.com/office/drawing/2010/main" Requires="a14">
+      <mc:AlternateContent xmlns:mc="http://schemas.openxmlformats.org/markup-compatibility/2006" xmlns:a14="http://schemas.microsoft.com/office/drawing/2010/main">
+        <mc:Choice Requires="a14">
           <p:sp>
             <p:nvSpPr>
               <p:cNvPr id="10" name="CaixaDeTexto 9">
@@ -13579,7 +13664,9 @@
                             <m:t>𝑑</m:t>
                           </m:r>
                           <m:r>
-                            <a:rPr lang="pt-BR" sz="2400"/>
+                            <a:rPr lang="pt-BR" sz="2400">
+                              <a:latin typeface="Cambria Math" panose="02040503050406030204" pitchFamily="18" charset="0"/>
+                            </a:rPr>
                             <m:t>𝑽</m:t>
                           </m:r>
                         </m:num>
@@ -13626,7 +13713,9 @@
                             <m:t>𝑑</m:t>
                           </m:r>
                           <m:r>
-                            <a:rPr lang="pt-BR" sz="2400"/>
+                            <a:rPr lang="pt-BR" sz="2400">
+                              <a:latin typeface="Cambria Math" panose="02040503050406030204" pitchFamily="18" charset="0"/>
+                            </a:rPr>
                             <m:t>𝑢</m:t>
                           </m:r>
                         </m:num>
@@ -13763,7 +13852,7 @@
             </p:txBody>
           </p:sp>
         </mc:Choice>
-        <mc:Fallback>
+        <mc:Fallback xmlns="">
           <p:sp>
             <p:nvSpPr>
               <p:cNvPr id="10" name="CaixaDeTexto 9">
@@ -13857,8 +13946,8 @@
           </a:p>
         </p:txBody>
       </p:sp>
-      <mc:AlternateContent xmlns:mc="http://schemas.openxmlformats.org/markup-compatibility/2006">
-        <mc:Choice xmlns:a14="http://schemas.microsoft.com/office/drawing/2010/main" Requires="a14">
+      <mc:AlternateContent xmlns:mc="http://schemas.openxmlformats.org/markup-compatibility/2006" xmlns:a14="http://schemas.microsoft.com/office/drawing/2010/main">
+        <mc:Choice Requires="a14">
           <p:sp>
             <p:nvSpPr>
               <p:cNvPr id="12" name="CaixaDeTexto 11">
@@ -13944,13 +14033,7 @@
                             <a:rPr lang="pt-BR" sz="2400" b="0" i="1" smtClean="0">
                               <a:latin typeface="Cambria Math" panose="02040503050406030204" pitchFamily="18" charset="0"/>
                             </a:rPr>
-                            <m:t>𝑑</m:t>
-                          </m:r>
-                          <m:r>
-                            <a:rPr lang="pt-BR" sz="2400" b="0" i="1" smtClean="0">
-                              <a:latin typeface="Cambria Math" panose="02040503050406030204" pitchFamily="18" charset="0"/>
-                            </a:rPr>
-                            <m:t>𝑢</m:t>
+                            <m:t>𝑑𝑢</m:t>
                           </m:r>
                         </m:num>
                         <m:den>
@@ -14082,22 +14165,30 @@
                       <m:f>
                         <m:fPr>
                           <m:ctrlPr>
-                            <a:rPr lang="pt-BR" sz="2400"/>
+                            <a:rPr lang="pt-BR" sz="2400" i="1">
+                              <a:latin typeface="Cambria Math" panose="02040503050406030204" pitchFamily="18" charset="0"/>
+                            </a:rPr>
                           </m:ctrlPr>
                         </m:fPr>
                         <m:num>
                           <m:r>
-                            <a:rPr lang="pt-BR" sz="2400"/>
+                            <a:rPr lang="pt-BR" sz="2400">
+                              <a:latin typeface="Cambria Math" panose="02040503050406030204" pitchFamily="18" charset="0"/>
+                            </a:rPr>
                             <m:t>𝜕</m:t>
                           </m:r>
                           <m:r>
-                            <a:rPr lang="pt-BR" sz="2400"/>
+                            <a:rPr lang="pt-BR" sz="2400">
+                              <a:latin typeface="Cambria Math" panose="02040503050406030204" pitchFamily="18" charset="0"/>
+                            </a:rPr>
                             <m:t>𝑢</m:t>
                           </m:r>
                         </m:num>
                         <m:den>
                           <m:r>
-                            <a:rPr lang="pt-BR" sz="2400"/>
+                            <a:rPr lang="pt-BR" sz="2400">
+                              <a:latin typeface="Cambria Math" panose="02040503050406030204" pitchFamily="18" charset="0"/>
+                            </a:rPr>
                             <m:t>𝜕</m:t>
                           </m:r>
                           <m:r>
@@ -14111,12 +14202,16 @@
                       <m:f>
                         <m:fPr>
                           <m:ctrlPr>
-                            <a:rPr lang="pt-BR" sz="2400"/>
+                            <a:rPr lang="pt-BR" sz="2400" i="1">
+                              <a:latin typeface="Cambria Math" panose="02040503050406030204" pitchFamily="18" charset="0"/>
+                            </a:rPr>
                           </m:ctrlPr>
                         </m:fPr>
                         <m:num>
                           <m:r>
-                            <a:rPr lang="pt-BR" sz="2400"/>
+                            <a:rPr lang="pt-BR" sz="2400">
+                              <a:latin typeface="Cambria Math" panose="02040503050406030204" pitchFamily="18" charset="0"/>
+                            </a:rPr>
                             <m:t>𝑑</m:t>
                           </m:r>
                           <m:r>
@@ -14128,34 +14223,46 @@
                         </m:num>
                         <m:den>
                           <m:r>
-                            <a:rPr lang="pt-BR" sz="2400"/>
+                            <a:rPr lang="pt-BR" sz="2400">
+                              <a:latin typeface="Cambria Math" panose="02040503050406030204" pitchFamily="18" charset="0"/>
+                            </a:rPr>
                             <m:t>𝑑𝑡</m:t>
                           </m:r>
                         </m:den>
                       </m:f>
                       <m:r>
-                        <a:rPr lang="pt-BR" sz="2400"/>
+                        <a:rPr lang="pt-BR" sz="2400">
+                          <a:latin typeface="Cambria Math" panose="02040503050406030204" pitchFamily="18" charset="0"/>
+                        </a:rPr>
                         <m:t>+</m:t>
                       </m:r>
                       <m:f>
                         <m:fPr>
                           <m:ctrlPr>
-                            <a:rPr lang="pt-BR" sz="2400"/>
+                            <a:rPr lang="pt-BR" sz="2400" i="1">
+                              <a:latin typeface="Cambria Math" panose="02040503050406030204" pitchFamily="18" charset="0"/>
+                            </a:rPr>
                           </m:ctrlPr>
                         </m:fPr>
                         <m:num>
                           <m:r>
-                            <a:rPr lang="pt-BR" sz="2400"/>
+                            <a:rPr lang="pt-BR" sz="2400">
+                              <a:latin typeface="Cambria Math" panose="02040503050406030204" pitchFamily="18" charset="0"/>
+                            </a:rPr>
                             <m:t>𝜕</m:t>
                           </m:r>
                           <m:r>
-                            <a:rPr lang="pt-BR" sz="2400"/>
+                            <a:rPr lang="pt-BR" sz="2400">
+                              <a:latin typeface="Cambria Math" panose="02040503050406030204" pitchFamily="18" charset="0"/>
+                            </a:rPr>
                             <m:t>𝑢</m:t>
                           </m:r>
                         </m:num>
                         <m:den>
                           <m:r>
-                            <a:rPr lang="pt-BR" sz="2400"/>
+                            <a:rPr lang="pt-BR" sz="2400">
+                              <a:latin typeface="Cambria Math" panose="02040503050406030204" pitchFamily="18" charset="0"/>
+                            </a:rPr>
                             <m:t>𝜕</m:t>
                           </m:r>
                           <m:r>
@@ -14169,12 +14276,16 @@
                       <m:f>
                         <m:fPr>
                           <m:ctrlPr>
-                            <a:rPr lang="pt-BR" sz="2400"/>
+                            <a:rPr lang="pt-BR" sz="2400" i="1">
+                              <a:latin typeface="Cambria Math" panose="02040503050406030204" pitchFamily="18" charset="0"/>
+                            </a:rPr>
                           </m:ctrlPr>
                         </m:fPr>
                         <m:num>
                           <m:r>
-                            <a:rPr lang="pt-BR" sz="2400"/>
+                            <a:rPr lang="pt-BR" sz="2400">
+                              <a:latin typeface="Cambria Math" panose="02040503050406030204" pitchFamily="18" charset="0"/>
+                            </a:rPr>
                             <m:t>𝑑</m:t>
                           </m:r>
                           <m:r>
@@ -14186,7 +14297,9 @@
                         </m:num>
                         <m:den>
                           <m:r>
-                            <a:rPr lang="pt-BR" sz="2400"/>
+                            <a:rPr lang="pt-BR" sz="2400">
+                              <a:latin typeface="Cambria Math" panose="02040503050406030204" pitchFamily="18" charset="0"/>
+                            </a:rPr>
                             <m:t>𝑑𝑡</m:t>
                           </m:r>
                         </m:den>
@@ -14199,7 +14312,7 @@
             </p:txBody>
           </p:sp>
         </mc:Choice>
-        <mc:Fallback>
+        <mc:Fallback xmlns="">
           <p:sp>
             <p:nvSpPr>
               <p:cNvPr id="12" name="CaixaDeTexto 11">
@@ -14293,8 +14406,8 @@
           </a:p>
         </p:txBody>
       </p:sp>
-      <mc:AlternateContent xmlns:mc="http://schemas.openxmlformats.org/markup-compatibility/2006">
-        <mc:Choice xmlns:a14="http://schemas.microsoft.com/office/drawing/2010/main" Requires="a14">
+      <mc:AlternateContent xmlns:mc="http://schemas.openxmlformats.org/markup-compatibility/2006" xmlns:a14="http://schemas.microsoft.com/office/drawing/2010/main">
+        <mc:Choice Requires="a14">
           <p:sp>
             <p:nvSpPr>
               <p:cNvPr id="14" name="CaixaDeTexto 13">
@@ -14512,12 +14625,16 @@
                       <m:f>
                         <m:fPr>
                           <m:ctrlPr>
-                            <a:rPr lang="pt-BR" sz="2400"/>
+                            <a:rPr lang="pt-BR" sz="2400" i="1">
+                              <a:latin typeface="Cambria Math" panose="02040503050406030204" pitchFamily="18" charset="0"/>
+                            </a:rPr>
                           </m:ctrlPr>
                         </m:fPr>
                         <m:num>
                           <m:r>
-                            <a:rPr lang="pt-BR" sz="2400"/>
+                            <a:rPr lang="pt-BR" sz="2400">
+                              <a:latin typeface="Cambria Math" panose="02040503050406030204" pitchFamily="18" charset="0"/>
+                            </a:rPr>
                             <m:t>𝜕</m:t>
                           </m:r>
                           <m:r>
@@ -14529,7 +14646,9 @@
                         </m:num>
                         <m:den>
                           <m:r>
-                            <a:rPr lang="pt-BR" sz="2400"/>
+                            <a:rPr lang="pt-BR" sz="2400">
+                              <a:latin typeface="Cambria Math" panose="02040503050406030204" pitchFamily="18" charset="0"/>
+                            </a:rPr>
                             <m:t>𝜕</m:t>
                           </m:r>
                           <m:r>
@@ -14543,12 +14662,16 @@
                       <m:f>
                         <m:fPr>
                           <m:ctrlPr>
-                            <a:rPr lang="pt-BR" sz="2400"/>
+                            <a:rPr lang="pt-BR" sz="2400" i="1">
+                              <a:latin typeface="Cambria Math" panose="02040503050406030204" pitchFamily="18" charset="0"/>
+                            </a:rPr>
                           </m:ctrlPr>
                         </m:fPr>
                         <m:num>
                           <m:r>
-                            <a:rPr lang="pt-BR" sz="2400"/>
+                            <a:rPr lang="pt-BR" sz="2400">
+                              <a:latin typeface="Cambria Math" panose="02040503050406030204" pitchFamily="18" charset="0"/>
+                            </a:rPr>
                             <m:t>𝑑</m:t>
                           </m:r>
                           <m:r>
@@ -14560,24 +14683,32 @@
                         </m:num>
                         <m:den>
                           <m:r>
-                            <a:rPr lang="pt-BR" sz="2400"/>
+                            <a:rPr lang="pt-BR" sz="2400">
+                              <a:latin typeface="Cambria Math" panose="02040503050406030204" pitchFamily="18" charset="0"/>
+                            </a:rPr>
                             <m:t>𝑑𝑡</m:t>
                           </m:r>
                         </m:den>
                       </m:f>
                       <m:r>
-                        <a:rPr lang="pt-BR" sz="2400"/>
+                        <a:rPr lang="pt-BR" sz="2400">
+                          <a:latin typeface="Cambria Math" panose="02040503050406030204" pitchFamily="18" charset="0"/>
+                        </a:rPr>
                         <m:t>+</m:t>
                       </m:r>
                       <m:f>
                         <m:fPr>
                           <m:ctrlPr>
-                            <a:rPr lang="pt-BR" sz="2400"/>
+                            <a:rPr lang="pt-BR" sz="2400" i="1">
+                              <a:latin typeface="Cambria Math" panose="02040503050406030204" pitchFamily="18" charset="0"/>
+                            </a:rPr>
                           </m:ctrlPr>
                         </m:fPr>
                         <m:num>
                           <m:r>
-                            <a:rPr lang="pt-BR" sz="2400"/>
+                            <a:rPr lang="pt-BR" sz="2400">
+                              <a:latin typeface="Cambria Math" panose="02040503050406030204" pitchFamily="18" charset="0"/>
+                            </a:rPr>
                             <m:t>𝜕</m:t>
                           </m:r>
                           <m:r>
@@ -14589,7 +14720,9 @@
                         </m:num>
                         <m:den>
                           <m:r>
-                            <a:rPr lang="pt-BR" sz="2400"/>
+                            <a:rPr lang="pt-BR" sz="2400">
+                              <a:latin typeface="Cambria Math" panose="02040503050406030204" pitchFamily="18" charset="0"/>
+                            </a:rPr>
                             <m:t>𝜕</m:t>
                           </m:r>
                           <m:r>
@@ -14603,12 +14736,16 @@
                       <m:f>
                         <m:fPr>
                           <m:ctrlPr>
-                            <a:rPr lang="pt-BR" sz="2400"/>
+                            <a:rPr lang="pt-BR" sz="2400" i="1">
+                              <a:latin typeface="Cambria Math" panose="02040503050406030204" pitchFamily="18" charset="0"/>
+                            </a:rPr>
                           </m:ctrlPr>
                         </m:fPr>
                         <m:num>
                           <m:r>
-                            <a:rPr lang="pt-BR" sz="2400"/>
+                            <a:rPr lang="pt-BR" sz="2400">
+                              <a:latin typeface="Cambria Math" panose="02040503050406030204" pitchFamily="18" charset="0"/>
+                            </a:rPr>
                             <m:t>𝑑</m:t>
                           </m:r>
                           <m:r>
@@ -14620,7 +14757,9 @@
                         </m:num>
                         <m:den>
                           <m:r>
-                            <a:rPr lang="pt-BR" sz="2400"/>
+                            <a:rPr lang="pt-BR" sz="2400">
+                              <a:latin typeface="Cambria Math" panose="02040503050406030204" pitchFamily="18" charset="0"/>
+                            </a:rPr>
                             <m:t>𝑑𝑡</m:t>
                           </m:r>
                         </m:den>
@@ -14633,7 +14772,7 @@
             </p:txBody>
           </p:sp>
         </mc:Choice>
-        <mc:Fallback>
+        <mc:Fallback xmlns="">
           <p:sp>
             <p:nvSpPr>
               <p:cNvPr id="14" name="CaixaDeTexto 13">
@@ -14727,8 +14866,8 @@
           </a:p>
         </p:txBody>
       </p:sp>
-      <mc:AlternateContent xmlns:mc="http://schemas.openxmlformats.org/markup-compatibility/2006">
-        <mc:Choice xmlns:a14="http://schemas.microsoft.com/office/drawing/2010/main" Requires="a14">
+      <mc:AlternateContent xmlns:mc="http://schemas.openxmlformats.org/markup-compatibility/2006" xmlns:a14="http://schemas.microsoft.com/office/drawing/2010/main">
+        <mc:Choice Requires="a14">
           <p:sp>
             <p:nvSpPr>
               <p:cNvPr id="16" name="CaixaDeTexto 15">
@@ -14814,13 +14953,7 @@
                             <a:rPr lang="pt-BR" sz="2400" b="0" i="1" smtClean="0">
                               <a:latin typeface="Cambria Math" panose="02040503050406030204" pitchFamily="18" charset="0"/>
                             </a:rPr>
-                            <m:t>𝑑</m:t>
-                          </m:r>
-                          <m:r>
-                            <a:rPr lang="pt-BR" sz="2400" b="0" i="1" smtClean="0">
-                              <a:latin typeface="Cambria Math" panose="02040503050406030204" pitchFamily="18" charset="0"/>
-                            </a:rPr>
-                            <m:t>𝑤</m:t>
+                            <m:t>𝑑𝑤</m:t>
                           </m:r>
                         </m:num>
                         <m:den>
@@ -14952,12 +15085,16 @@
                       <m:f>
                         <m:fPr>
                           <m:ctrlPr>
-                            <a:rPr lang="pt-BR" sz="2400"/>
+                            <a:rPr lang="pt-BR" sz="2400" i="1">
+                              <a:latin typeface="Cambria Math" panose="02040503050406030204" pitchFamily="18" charset="0"/>
+                            </a:rPr>
                           </m:ctrlPr>
                         </m:fPr>
                         <m:num>
                           <m:r>
-                            <a:rPr lang="pt-BR" sz="2400"/>
+                            <a:rPr lang="pt-BR" sz="2400">
+                              <a:latin typeface="Cambria Math" panose="02040503050406030204" pitchFamily="18" charset="0"/>
+                            </a:rPr>
                             <m:t>𝜕</m:t>
                           </m:r>
                           <m:r>
@@ -14969,7 +15106,9 @@
                         </m:num>
                         <m:den>
                           <m:r>
-                            <a:rPr lang="pt-BR" sz="2400"/>
+                            <a:rPr lang="pt-BR" sz="2400">
+                              <a:latin typeface="Cambria Math" panose="02040503050406030204" pitchFamily="18" charset="0"/>
+                            </a:rPr>
                             <m:t>𝜕</m:t>
                           </m:r>
                           <m:r>
@@ -14983,12 +15122,16 @@
                       <m:f>
                         <m:fPr>
                           <m:ctrlPr>
-                            <a:rPr lang="pt-BR" sz="2400"/>
+                            <a:rPr lang="pt-BR" sz="2400" i="1">
+                              <a:latin typeface="Cambria Math" panose="02040503050406030204" pitchFamily="18" charset="0"/>
+                            </a:rPr>
                           </m:ctrlPr>
                         </m:fPr>
                         <m:num>
                           <m:r>
-                            <a:rPr lang="pt-BR" sz="2400"/>
+                            <a:rPr lang="pt-BR" sz="2400">
+                              <a:latin typeface="Cambria Math" panose="02040503050406030204" pitchFamily="18" charset="0"/>
+                            </a:rPr>
                             <m:t>𝑑</m:t>
                           </m:r>
                           <m:r>
@@ -15000,24 +15143,32 @@
                         </m:num>
                         <m:den>
                           <m:r>
-                            <a:rPr lang="pt-BR" sz="2400"/>
+                            <a:rPr lang="pt-BR" sz="2400">
+                              <a:latin typeface="Cambria Math" panose="02040503050406030204" pitchFamily="18" charset="0"/>
+                            </a:rPr>
                             <m:t>𝑑𝑡</m:t>
                           </m:r>
                         </m:den>
                       </m:f>
                       <m:r>
-                        <a:rPr lang="pt-BR" sz="2400"/>
+                        <a:rPr lang="pt-BR" sz="2400">
+                          <a:latin typeface="Cambria Math" panose="02040503050406030204" pitchFamily="18" charset="0"/>
+                        </a:rPr>
                         <m:t>+</m:t>
                       </m:r>
                       <m:f>
                         <m:fPr>
                           <m:ctrlPr>
-                            <a:rPr lang="pt-BR" sz="2400"/>
+                            <a:rPr lang="pt-BR" sz="2400" i="1">
+                              <a:latin typeface="Cambria Math" panose="02040503050406030204" pitchFamily="18" charset="0"/>
+                            </a:rPr>
                           </m:ctrlPr>
                         </m:fPr>
                         <m:num>
                           <m:r>
-                            <a:rPr lang="pt-BR" sz="2400"/>
+                            <a:rPr lang="pt-BR" sz="2400">
+                              <a:latin typeface="Cambria Math" panose="02040503050406030204" pitchFamily="18" charset="0"/>
+                            </a:rPr>
                             <m:t>𝜕</m:t>
                           </m:r>
                           <m:r>
@@ -15029,7 +15180,9 @@
                         </m:num>
                         <m:den>
                           <m:r>
-                            <a:rPr lang="pt-BR" sz="2400"/>
+                            <a:rPr lang="pt-BR" sz="2400">
+                              <a:latin typeface="Cambria Math" panose="02040503050406030204" pitchFamily="18" charset="0"/>
+                            </a:rPr>
                             <m:t>𝜕</m:t>
                           </m:r>
                           <m:r>
@@ -15043,12 +15196,16 @@
                       <m:f>
                         <m:fPr>
                           <m:ctrlPr>
-                            <a:rPr lang="pt-BR" sz="2400"/>
+                            <a:rPr lang="pt-BR" sz="2400" i="1">
+                              <a:latin typeface="Cambria Math" panose="02040503050406030204" pitchFamily="18" charset="0"/>
+                            </a:rPr>
                           </m:ctrlPr>
                         </m:fPr>
                         <m:num>
                           <m:r>
-                            <a:rPr lang="pt-BR" sz="2400"/>
+                            <a:rPr lang="pt-BR" sz="2400">
+                              <a:latin typeface="Cambria Math" panose="02040503050406030204" pitchFamily="18" charset="0"/>
+                            </a:rPr>
                             <m:t>𝑑</m:t>
                           </m:r>
                           <m:r>
@@ -15060,7 +15217,9 @@
                         </m:num>
                         <m:den>
                           <m:r>
-                            <a:rPr lang="pt-BR" sz="2400"/>
+                            <a:rPr lang="pt-BR" sz="2400">
+                              <a:latin typeface="Cambria Math" panose="02040503050406030204" pitchFamily="18" charset="0"/>
+                            </a:rPr>
                             <m:t>𝑑𝑡</m:t>
                           </m:r>
                         </m:den>
@@ -15073,7 +15232,7 @@
             </p:txBody>
           </p:sp>
         </mc:Choice>
-        <mc:Fallback>
+        <mc:Fallback xmlns="">
           <p:sp>
             <p:nvSpPr>
               <p:cNvPr id="16" name="CaixaDeTexto 15">
@@ -15402,7 +15561,7 @@
             <a:pPr rtl="0"/>
             <a:fld id="{63237813-B0A3-4431-9C44-B25D3B956C2A}" type="datetime1">
               <a:rPr lang="pt-BR" smtClean="0"/>
-              <a:t>12/02/2022</a:t>
+              <a:t>26/02/2022</a:t>
             </a:fld>
             <a:endParaRPr lang="en-US" dirty="0"/>
           </a:p>
@@ -15468,8 +15627,8 @@
           </a:p>
         </p:txBody>
       </p:sp>
-      <mc:AlternateContent xmlns:mc="http://schemas.openxmlformats.org/markup-compatibility/2006">
-        <mc:Choice xmlns:a14="http://schemas.microsoft.com/office/drawing/2010/main" Requires="a14">
+      <mc:AlternateContent xmlns:mc="http://schemas.openxmlformats.org/markup-compatibility/2006" xmlns:a14="http://schemas.microsoft.com/office/drawing/2010/main">
+        <mc:Choice Requires="a14">
           <p:sp>
             <p:nvSpPr>
               <p:cNvPr id="10" name="CaixaDeTexto 9">
@@ -15758,7 +15917,7 @@
             </p:txBody>
           </p:sp>
         </mc:Choice>
-        <mc:Fallback>
+        <mc:Fallback xmlns="">
           <p:sp>
             <p:nvSpPr>
               <p:cNvPr id="10" name="CaixaDeTexto 9">
@@ -15852,8 +16011,8 @@
           </a:p>
         </p:txBody>
       </p:sp>
-      <mc:AlternateContent xmlns:mc="http://schemas.openxmlformats.org/markup-compatibility/2006">
-        <mc:Choice xmlns:a14="http://schemas.microsoft.com/office/drawing/2010/main" Requires="a14">
+      <mc:AlternateContent xmlns:mc="http://schemas.openxmlformats.org/markup-compatibility/2006" xmlns:a14="http://schemas.microsoft.com/office/drawing/2010/main">
+        <mc:Choice Requires="a14">
           <p:sp>
             <p:nvSpPr>
               <p:cNvPr id="12" name="CaixaDeTexto 11">
@@ -16149,7 +16308,7 @@
             </p:txBody>
           </p:sp>
         </mc:Choice>
-        <mc:Fallback>
+        <mc:Fallback xmlns="">
           <p:sp>
             <p:nvSpPr>
               <p:cNvPr id="12" name="CaixaDeTexto 11">
@@ -16243,8 +16402,8 @@
           </a:p>
         </p:txBody>
       </p:sp>
-      <mc:AlternateContent xmlns:mc="http://schemas.openxmlformats.org/markup-compatibility/2006">
-        <mc:Choice xmlns:a14="http://schemas.microsoft.com/office/drawing/2010/main" Requires="a14">
+      <mc:AlternateContent xmlns:mc="http://schemas.openxmlformats.org/markup-compatibility/2006" xmlns:a14="http://schemas.microsoft.com/office/drawing/2010/main">
+        <mc:Choice Requires="a14">
           <p:sp>
             <p:nvSpPr>
               <p:cNvPr id="14" name="CaixaDeTexto 13">
@@ -16540,7 +16699,7 @@
             </p:txBody>
           </p:sp>
         </mc:Choice>
-        <mc:Fallback>
+        <mc:Fallback xmlns="">
           <p:sp>
             <p:nvSpPr>
               <p:cNvPr id="14" name="CaixaDeTexto 13">
@@ -16634,8 +16793,8 @@
           </a:p>
         </p:txBody>
       </p:sp>
-      <mc:AlternateContent xmlns:mc="http://schemas.openxmlformats.org/markup-compatibility/2006">
-        <mc:Choice xmlns:a14="http://schemas.microsoft.com/office/drawing/2010/main" Requires="a14">
+      <mc:AlternateContent xmlns:mc="http://schemas.openxmlformats.org/markup-compatibility/2006" xmlns:a14="http://schemas.microsoft.com/office/drawing/2010/main">
+        <mc:Choice Requires="a14">
           <p:sp>
             <p:nvSpPr>
               <p:cNvPr id="16" name="CaixaDeTexto 15">
@@ -16931,7 +17090,7 @@
             </p:txBody>
           </p:sp>
         </mc:Choice>
-        <mc:Fallback>
+        <mc:Fallback xmlns="">
           <p:sp>
             <p:nvSpPr>
               <p:cNvPr id="16" name="CaixaDeTexto 15">
@@ -17260,7 +17419,7 @@
             <a:pPr rtl="0"/>
             <a:fld id="{63237813-B0A3-4431-9C44-B25D3B956C2A}" type="datetime1">
               <a:rPr lang="pt-BR" smtClean="0"/>
-              <a:t>12/02/2022</a:t>
+              <a:t>26/02/2022</a:t>
             </a:fld>
             <a:endParaRPr lang="en-US" dirty="0"/>
           </a:p>
@@ -17326,8 +17485,8 @@
           </a:p>
         </p:txBody>
       </p:sp>
-      <mc:AlternateContent xmlns:mc="http://schemas.openxmlformats.org/markup-compatibility/2006">
-        <mc:Choice xmlns:a14="http://schemas.microsoft.com/office/drawing/2010/main" Requires="a14">
+      <mc:AlternateContent xmlns:mc="http://schemas.openxmlformats.org/markup-compatibility/2006" xmlns:a14="http://schemas.microsoft.com/office/drawing/2010/main">
+        <mc:Choice Requires="a14">
           <p:sp>
             <p:nvSpPr>
               <p:cNvPr id="10" name="CaixaDeTexto 9">
@@ -17616,7 +17775,7 @@
             </p:txBody>
           </p:sp>
         </mc:Choice>
-        <mc:Fallback>
+        <mc:Fallback xmlns="">
           <p:sp>
             <p:nvSpPr>
               <p:cNvPr id="10" name="CaixaDeTexto 9">
@@ -17710,8 +17869,8 @@
           </a:p>
         </p:txBody>
       </p:sp>
-      <mc:AlternateContent xmlns:mc="http://schemas.openxmlformats.org/markup-compatibility/2006">
-        <mc:Choice xmlns:a14="http://schemas.microsoft.com/office/drawing/2010/main" Requires="a14">
+      <mc:AlternateContent xmlns:mc="http://schemas.openxmlformats.org/markup-compatibility/2006" xmlns:a14="http://schemas.microsoft.com/office/drawing/2010/main">
+        <mc:Choice Requires="a14">
           <p:sp>
             <p:nvSpPr>
               <p:cNvPr id="12" name="CaixaDeTexto 11">
@@ -17868,17 +18027,21 @@
                         </m:dPr>
                         <m:e>
                           <m:r>
-                            <a:rPr lang="pt-BR" sz="2400" b="1" i="1" smtClean="0"/>
+                            <a:rPr lang="pt-BR" sz="2400" b="1" i="1" smtClean="0">
+                              <a:latin typeface="Cambria Math" panose="02040503050406030204" pitchFamily="18" charset="0"/>
+                            </a:rPr>
                             <m:t>𝑽</m:t>
                           </m:r>
                           <m:r>
                             <a:rPr lang="pt-BR" sz="2400" b="1" i="1" smtClean="0">
+                              <a:latin typeface="Cambria Math" panose="02040503050406030204" pitchFamily="18" charset="0"/>
                               <a:ea typeface="Cambria Math" panose="02040503050406030204" pitchFamily="18" charset="0"/>
                             </a:rPr>
                             <m:t>∙</m:t>
                           </m:r>
                           <m:r>
                             <a:rPr lang="pt-BR" sz="2400" b="1" i="1" smtClean="0">
+                              <a:latin typeface="Cambria Math" panose="02040503050406030204" pitchFamily="18" charset="0"/>
                               <a:ea typeface="Cambria Math" panose="02040503050406030204" pitchFamily="18" charset="0"/>
                             </a:rPr>
                             <m:t>𝜵</m:t>
@@ -17899,7 +18062,7 @@
             </p:txBody>
           </p:sp>
         </mc:Choice>
-        <mc:Fallback>
+        <mc:Fallback xmlns="">
           <p:sp>
             <p:nvSpPr>
               <p:cNvPr id="12" name="CaixaDeTexto 11">
@@ -17993,8 +18156,8 @@
           </a:p>
         </p:txBody>
       </p:sp>
-      <mc:AlternateContent xmlns:mc="http://schemas.openxmlformats.org/markup-compatibility/2006">
-        <mc:Choice xmlns:a14="http://schemas.microsoft.com/office/drawing/2010/main" Requires="a14">
+      <mc:AlternateContent xmlns:mc="http://schemas.openxmlformats.org/markup-compatibility/2006" xmlns:a14="http://schemas.microsoft.com/office/drawing/2010/main">
+        <mc:Choice Requires="a14">
           <p:sp>
             <p:nvSpPr>
               <p:cNvPr id="14" name="CaixaDeTexto 13">
@@ -18144,22 +18307,28 @@
                       <m:d>
                         <m:dPr>
                           <m:ctrlPr>
-                            <a:rPr lang="pt-BR" sz="2400"/>
+                            <a:rPr lang="pt-BR" sz="2400" i="1">
+                              <a:latin typeface="Cambria Math" panose="02040503050406030204" pitchFamily="18" charset="0"/>
+                            </a:rPr>
                           </m:ctrlPr>
                         </m:dPr>
                         <m:e>
                           <m:r>
-                            <a:rPr lang="pt-BR" sz="2400" b="1"/>
+                            <a:rPr lang="pt-BR" sz="2400" b="1">
+                              <a:latin typeface="Cambria Math" panose="02040503050406030204" pitchFamily="18" charset="0"/>
+                            </a:rPr>
                             <m:t>𝑽</m:t>
                           </m:r>
                           <m:r>
                             <a:rPr lang="pt-BR" sz="2400" b="1">
+                              <a:latin typeface="Cambria Math" panose="02040503050406030204" pitchFamily="18" charset="0"/>
                               <a:ea typeface="Cambria Math" panose="02040503050406030204" pitchFamily="18" charset="0"/>
                             </a:rPr>
                             <m:t>∙</m:t>
                           </m:r>
                           <m:r>
                             <a:rPr lang="pt-BR" sz="2400" b="1">
+                              <a:latin typeface="Cambria Math" panose="02040503050406030204" pitchFamily="18" charset="0"/>
                               <a:ea typeface="Cambria Math" panose="02040503050406030204" pitchFamily="18" charset="0"/>
                             </a:rPr>
                             <m:t>𝜵</m:t>
@@ -18180,7 +18349,7 @@
             </p:txBody>
           </p:sp>
         </mc:Choice>
-        <mc:Fallback>
+        <mc:Fallback xmlns="">
           <p:sp>
             <p:nvSpPr>
               <p:cNvPr id="14" name="CaixaDeTexto 13">
@@ -18274,8 +18443,8 @@
           </a:p>
         </p:txBody>
       </p:sp>
-      <mc:AlternateContent xmlns:mc="http://schemas.openxmlformats.org/markup-compatibility/2006">
-        <mc:Choice xmlns:a14="http://schemas.microsoft.com/office/drawing/2010/main" Requires="a14">
+      <mc:AlternateContent xmlns:mc="http://schemas.openxmlformats.org/markup-compatibility/2006" xmlns:a14="http://schemas.microsoft.com/office/drawing/2010/main">
+        <mc:Choice Requires="a14">
           <p:sp>
             <p:nvSpPr>
               <p:cNvPr id="16" name="CaixaDeTexto 15">
@@ -18425,22 +18594,28 @@
                       <m:d>
                         <m:dPr>
                           <m:ctrlPr>
-                            <a:rPr lang="pt-BR" sz="2400"/>
+                            <a:rPr lang="pt-BR" sz="2400" i="1">
+                              <a:latin typeface="Cambria Math" panose="02040503050406030204" pitchFamily="18" charset="0"/>
+                            </a:rPr>
                           </m:ctrlPr>
                         </m:dPr>
                         <m:e>
                           <m:r>
-                            <a:rPr lang="pt-BR" sz="2400" b="1"/>
+                            <a:rPr lang="pt-BR" sz="2400" b="1">
+                              <a:latin typeface="Cambria Math" panose="02040503050406030204" pitchFamily="18" charset="0"/>
+                            </a:rPr>
                             <m:t>𝑽</m:t>
                           </m:r>
                           <m:r>
                             <a:rPr lang="pt-BR" sz="2400" b="1">
+                              <a:latin typeface="Cambria Math" panose="02040503050406030204" pitchFamily="18" charset="0"/>
                               <a:ea typeface="Cambria Math" panose="02040503050406030204" pitchFamily="18" charset="0"/>
                             </a:rPr>
                             <m:t>∙</m:t>
                           </m:r>
                           <m:r>
                             <a:rPr lang="pt-BR" sz="2400" b="1">
+                              <a:latin typeface="Cambria Math" panose="02040503050406030204" pitchFamily="18" charset="0"/>
                               <a:ea typeface="Cambria Math" panose="02040503050406030204" pitchFamily="18" charset="0"/>
                             </a:rPr>
                             <m:t>𝜵</m:t>
@@ -18461,7 +18636,7 @@
             </p:txBody>
           </p:sp>
         </mc:Choice>
-        <mc:Fallback>
+        <mc:Fallback xmlns="">
           <p:sp>
             <p:nvSpPr>
               <p:cNvPr id="16" name="CaixaDeTexto 15">
@@ -18774,7 +18949,7 @@
             <a:pPr rtl="0"/>
             <a:fld id="{63237813-B0A3-4431-9C44-B25D3B956C2A}" type="datetime1">
               <a:rPr lang="pt-BR" smtClean="0"/>
-              <a:t>12/02/2022</a:t>
+              <a:t>26/02/2022</a:t>
             </a:fld>
             <a:endParaRPr lang="en-US" dirty="0"/>
           </a:p>
@@ -18840,8 +19015,8 @@
           </a:p>
         </p:txBody>
       </p:sp>
-      <mc:AlternateContent xmlns:mc="http://schemas.openxmlformats.org/markup-compatibility/2006">
-        <mc:Choice xmlns:a14="http://schemas.microsoft.com/office/drawing/2010/main" Requires="a14">
+      <mc:AlternateContent xmlns:mc="http://schemas.openxmlformats.org/markup-compatibility/2006" xmlns:a14="http://schemas.microsoft.com/office/drawing/2010/main">
+        <mc:Choice Requires="a14">
           <p:sp>
             <p:nvSpPr>
               <p:cNvPr id="10" name="CaixaDeTexto 9">
@@ -19130,7 +19305,7 @@
             </p:txBody>
           </p:sp>
         </mc:Choice>
-        <mc:Fallback>
+        <mc:Fallback xmlns="">
           <p:sp>
             <p:nvSpPr>
               <p:cNvPr id="10" name="CaixaDeTexto 9">
@@ -19224,8 +19399,8 @@
           </a:p>
         </p:txBody>
       </p:sp>
-      <mc:AlternateContent xmlns:mc="http://schemas.openxmlformats.org/markup-compatibility/2006">
-        <mc:Choice xmlns:a14="http://schemas.microsoft.com/office/drawing/2010/main" Requires="a14">
+      <mc:AlternateContent xmlns:mc="http://schemas.openxmlformats.org/markup-compatibility/2006" xmlns:a14="http://schemas.microsoft.com/office/drawing/2010/main">
+        <mc:Choice Requires="a14">
           <p:sp>
             <p:nvSpPr>
               <p:cNvPr id="18" name="CaixaDeTexto 17">
@@ -19299,175 +19474,243 @@
                     </m:oMathParaPr>
                     <m:oMath xmlns:m="http://schemas.openxmlformats.org/officeDocument/2006/math">
                       <m:r>
-                        <a:rPr lang="pt-BR"/>
+                        <a:rPr lang="pt-BR">
+                          <a:latin typeface="Cambria Math" panose="02040503050406030204" pitchFamily="18" charset="0"/>
+                        </a:rPr>
                         <m:t>𝒂</m:t>
                       </m:r>
                       <m:r>
-                        <a:rPr lang="pt-BR"/>
+                        <a:rPr lang="pt-BR">
+                          <a:latin typeface="Cambria Math" panose="02040503050406030204" pitchFamily="18" charset="0"/>
+                        </a:rPr>
                         <m:t>=</m:t>
                       </m:r>
                       <m:f>
                         <m:fPr>
                           <m:ctrlPr>
-                            <a:rPr lang="pt-BR"/>
+                            <a:rPr lang="pt-BR" i="1">
+                              <a:latin typeface="Cambria Math" panose="02040503050406030204" pitchFamily="18" charset="0"/>
+                            </a:rPr>
                           </m:ctrlPr>
                         </m:fPr>
                         <m:num>
                           <m:r>
-                            <a:rPr lang="pt-BR"/>
+                            <a:rPr lang="pt-BR">
+                              <a:latin typeface="Cambria Math" panose="02040503050406030204" pitchFamily="18" charset="0"/>
+                            </a:rPr>
                             <m:t>𝑑</m:t>
                           </m:r>
                           <m:r>
-                            <a:rPr lang="pt-BR"/>
+                            <a:rPr lang="pt-BR">
+                              <a:latin typeface="Cambria Math" panose="02040503050406030204" pitchFamily="18" charset="0"/>
+                            </a:rPr>
                             <m:t>𝑽</m:t>
                           </m:r>
                         </m:num>
                         <m:den>
                           <m:r>
-                            <a:rPr lang="pt-BR"/>
+                            <a:rPr lang="pt-BR">
+                              <a:latin typeface="Cambria Math" panose="02040503050406030204" pitchFamily="18" charset="0"/>
+                            </a:rPr>
                             <m:t>𝑑𝑡</m:t>
                           </m:r>
                         </m:den>
                       </m:f>
                       <m:r>
-                        <a:rPr lang="pt-BR"/>
+                        <a:rPr lang="pt-BR">
+                          <a:latin typeface="Cambria Math" panose="02040503050406030204" pitchFamily="18" charset="0"/>
+                        </a:rPr>
                         <m:t>=</m:t>
                       </m:r>
                       <m:f>
                         <m:fPr>
                           <m:ctrlPr>
-                            <a:rPr lang="pt-BR"/>
+                            <a:rPr lang="pt-BR" i="1">
+                              <a:latin typeface="Cambria Math" panose="02040503050406030204" pitchFamily="18" charset="0"/>
+                            </a:rPr>
                           </m:ctrlPr>
                         </m:fPr>
                         <m:num>
                           <m:r>
-                            <a:rPr lang="pt-BR"/>
+                            <a:rPr lang="pt-BR">
+                              <a:latin typeface="Cambria Math" panose="02040503050406030204" pitchFamily="18" charset="0"/>
+                            </a:rPr>
                             <m:t>𝜕</m:t>
                           </m:r>
                           <m:r>
-                            <a:rPr lang="pt-BR"/>
+                            <a:rPr lang="pt-BR">
+                              <a:latin typeface="Cambria Math" panose="02040503050406030204" pitchFamily="18" charset="0"/>
+                            </a:rPr>
                             <m:t>𝑽</m:t>
                           </m:r>
                         </m:num>
                         <m:den>
                           <m:r>
-                            <a:rPr lang="pt-BR"/>
+                            <a:rPr lang="pt-BR">
+                              <a:latin typeface="Cambria Math" panose="02040503050406030204" pitchFamily="18" charset="0"/>
+                            </a:rPr>
                             <m:t>𝜕</m:t>
                           </m:r>
                           <m:r>
-                            <a:rPr lang="pt-BR"/>
+                            <a:rPr lang="pt-BR">
+                              <a:latin typeface="Cambria Math" panose="02040503050406030204" pitchFamily="18" charset="0"/>
+                            </a:rPr>
                             <m:t>𝑡</m:t>
                           </m:r>
                         </m:den>
                       </m:f>
                       <m:r>
-                        <a:rPr lang="pt-BR"/>
+                        <a:rPr lang="pt-BR">
+                          <a:latin typeface="Cambria Math" panose="02040503050406030204" pitchFamily="18" charset="0"/>
+                        </a:rPr>
                         <m:t>+</m:t>
                       </m:r>
                       <m:d>
                         <m:dPr>
                           <m:ctrlPr>
-                            <a:rPr lang="pt-BR"/>
+                            <a:rPr lang="pt-BR" i="1">
+                              <a:latin typeface="Cambria Math" panose="02040503050406030204" pitchFamily="18" charset="0"/>
+                            </a:rPr>
                           </m:ctrlPr>
                         </m:dPr>
                         <m:e>
                           <m:r>
-                            <a:rPr lang="pt-BR"/>
+                            <a:rPr lang="pt-BR">
+                              <a:latin typeface="Cambria Math" panose="02040503050406030204" pitchFamily="18" charset="0"/>
+                            </a:rPr>
                             <m:t>𝑢</m:t>
                           </m:r>
                           <m:f>
                             <m:fPr>
                               <m:ctrlPr>
-                                <a:rPr lang="pt-BR"/>
+                                <a:rPr lang="pt-BR" i="1">
+                                  <a:latin typeface="Cambria Math" panose="02040503050406030204" pitchFamily="18" charset="0"/>
+                                </a:rPr>
                               </m:ctrlPr>
                             </m:fPr>
                             <m:num>
                               <m:r>
-                                <a:rPr lang="pt-BR"/>
+                                <a:rPr lang="pt-BR">
+                                  <a:latin typeface="Cambria Math" panose="02040503050406030204" pitchFamily="18" charset="0"/>
+                                </a:rPr>
                                 <m:t>𝜕</m:t>
                               </m:r>
                               <m:r>
-                                <a:rPr lang="pt-BR"/>
+                                <a:rPr lang="pt-BR">
+                                  <a:latin typeface="Cambria Math" panose="02040503050406030204" pitchFamily="18" charset="0"/>
+                                </a:rPr>
                                 <m:t>𝑽</m:t>
                               </m:r>
                             </m:num>
                             <m:den>
                               <m:r>
-                                <a:rPr lang="pt-BR"/>
+                                <a:rPr lang="pt-BR">
+                                  <a:latin typeface="Cambria Math" panose="02040503050406030204" pitchFamily="18" charset="0"/>
+                                </a:rPr>
                                 <m:t>𝜕</m:t>
                               </m:r>
                               <m:r>
-                                <a:rPr lang="pt-BR"/>
+                                <a:rPr lang="pt-BR">
+                                  <a:latin typeface="Cambria Math" panose="02040503050406030204" pitchFamily="18" charset="0"/>
+                                </a:rPr>
                                 <m:t>𝑥</m:t>
                               </m:r>
                             </m:den>
                           </m:f>
                           <m:r>
-                            <a:rPr lang="pt-BR"/>
+                            <a:rPr lang="pt-BR">
+                              <a:latin typeface="Cambria Math" panose="02040503050406030204" pitchFamily="18" charset="0"/>
+                            </a:rPr>
                             <m:t>+</m:t>
                           </m:r>
                           <m:r>
-                            <a:rPr lang="pt-BR"/>
+                            <a:rPr lang="pt-BR">
+                              <a:latin typeface="Cambria Math" panose="02040503050406030204" pitchFamily="18" charset="0"/>
+                            </a:rPr>
                             <m:t>𝑣</m:t>
                           </m:r>
                           <m:f>
                             <m:fPr>
                               <m:ctrlPr>
-                                <a:rPr lang="pt-BR"/>
+                                <a:rPr lang="pt-BR" i="1">
+                                  <a:latin typeface="Cambria Math" panose="02040503050406030204" pitchFamily="18" charset="0"/>
+                                </a:rPr>
                               </m:ctrlPr>
                             </m:fPr>
                             <m:num>
                               <m:r>
-                                <a:rPr lang="pt-BR"/>
+                                <a:rPr lang="pt-BR">
+                                  <a:latin typeface="Cambria Math" panose="02040503050406030204" pitchFamily="18" charset="0"/>
+                                </a:rPr>
                                 <m:t>𝜕</m:t>
                               </m:r>
                               <m:r>
-                                <a:rPr lang="pt-BR"/>
+                                <a:rPr lang="pt-BR">
+                                  <a:latin typeface="Cambria Math" panose="02040503050406030204" pitchFamily="18" charset="0"/>
+                                </a:rPr>
                                 <m:t>𝑽</m:t>
                               </m:r>
                             </m:num>
                             <m:den>
                               <m:r>
-                                <a:rPr lang="pt-BR"/>
+                                <a:rPr lang="pt-BR">
+                                  <a:latin typeface="Cambria Math" panose="02040503050406030204" pitchFamily="18" charset="0"/>
+                                </a:rPr>
                                 <m:t>𝜕</m:t>
                               </m:r>
                               <m:r>
-                                <a:rPr lang="pt-BR"/>
+                                <a:rPr lang="pt-BR">
+                                  <a:latin typeface="Cambria Math" panose="02040503050406030204" pitchFamily="18" charset="0"/>
+                                </a:rPr>
                                 <m:t>𝑦</m:t>
                               </m:r>
                             </m:den>
                           </m:f>
                           <m:r>
-                            <a:rPr lang="pt-BR"/>
+                            <a:rPr lang="pt-BR">
+                              <a:latin typeface="Cambria Math" panose="02040503050406030204" pitchFamily="18" charset="0"/>
+                            </a:rPr>
                             <m:t>+</m:t>
                           </m:r>
                           <m:r>
-                            <a:rPr lang="pt-BR"/>
+                            <a:rPr lang="pt-BR">
+                              <a:latin typeface="Cambria Math" panose="02040503050406030204" pitchFamily="18" charset="0"/>
+                            </a:rPr>
                             <m:t>𝑤</m:t>
                           </m:r>
                           <m:f>
                             <m:fPr>
                               <m:ctrlPr>
-                                <a:rPr lang="pt-BR"/>
+                                <a:rPr lang="pt-BR" i="1">
+                                  <a:latin typeface="Cambria Math" panose="02040503050406030204" pitchFamily="18" charset="0"/>
+                                </a:rPr>
                               </m:ctrlPr>
                             </m:fPr>
                             <m:num>
                               <m:r>
-                                <a:rPr lang="pt-BR"/>
+                                <a:rPr lang="pt-BR">
+                                  <a:latin typeface="Cambria Math" panose="02040503050406030204" pitchFamily="18" charset="0"/>
+                                </a:rPr>
                                 <m:t>𝜕</m:t>
                               </m:r>
                               <m:r>
-                                <a:rPr lang="pt-BR"/>
+                                <a:rPr lang="pt-BR">
+                                  <a:latin typeface="Cambria Math" panose="02040503050406030204" pitchFamily="18" charset="0"/>
+                                </a:rPr>
                                 <m:t>𝑽</m:t>
                               </m:r>
                             </m:num>
                             <m:den>
                               <m:r>
-                                <a:rPr lang="pt-BR"/>
+                                <a:rPr lang="pt-BR">
+                                  <a:latin typeface="Cambria Math" panose="02040503050406030204" pitchFamily="18" charset="0"/>
+                                </a:rPr>
                                 <m:t>𝜕</m:t>
                               </m:r>
                               <m:r>
-                                <a:rPr lang="pt-BR"/>
+                                <a:rPr lang="pt-BR">
+                                  <a:latin typeface="Cambria Math" panose="02040503050406030204" pitchFamily="18" charset="0"/>
+                                </a:rPr>
                                 <m:t>𝑧</m:t>
                               </m:r>
                             </m:den>
@@ -19482,7 +19725,7 @@
             </p:txBody>
           </p:sp>
         </mc:Choice>
-        <mc:Fallback>
+        <mc:Fallback xmlns="">
           <p:sp>
             <p:nvSpPr>
               <p:cNvPr id="18" name="CaixaDeTexto 17">
@@ -19576,8 +19819,8 @@
           </a:p>
         </p:txBody>
       </p:sp>
-      <mc:AlternateContent xmlns:mc="http://schemas.openxmlformats.org/markup-compatibility/2006">
-        <mc:Choice xmlns:a14="http://schemas.microsoft.com/office/drawing/2010/main" Requires="a14">
+      <mc:AlternateContent xmlns:mc="http://schemas.openxmlformats.org/markup-compatibility/2006" xmlns:a14="http://schemas.microsoft.com/office/drawing/2010/main">
+        <mc:Choice Requires="a14">
           <p:sp>
             <p:nvSpPr>
               <p:cNvPr id="21" name="CaixaDeTexto 20">
@@ -19655,6 +19898,7 @@
                           <a:solidFill>
                             <a:srgbClr val="FFFF00"/>
                           </a:solidFill>
+                          <a:latin typeface="Cambria Math" panose="02040503050406030204" pitchFamily="18" charset="0"/>
                         </a:rPr>
                         <m:t>𝒂</m:t>
                       </m:r>
@@ -19663,43 +19907,48 @@
                           <a:solidFill>
                             <a:srgbClr val="FFFF00"/>
                           </a:solidFill>
+                          <a:latin typeface="Cambria Math" panose="02040503050406030204" pitchFamily="18" charset="0"/>
                         </a:rPr>
                         <m:t>=</m:t>
                       </m:r>
                       <m:f>
                         <m:fPr>
                           <m:ctrlPr>
+                            <a:rPr lang="pt-BR" i="1">
+                              <a:solidFill>
+                                <a:srgbClr val="FFFF00"/>
+                              </a:solidFill>
+                              <a:latin typeface="Cambria Math" panose="02040503050406030204" pitchFamily="18" charset="0"/>
+                            </a:rPr>
+                          </m:ctrlPr>
+                        </m:fPr>
+                        <m:num>
+                          <m:r>
                             <a:rPr lang="pt-BR">
                               <a:solidFill>
                                 <a:srgbClr val="FFFF00"/>
                               </a:solidFill>
-                            </a:rPr>
-                          </m:ctrlPr>
-                        </m:fPr>
-                        <m:num>
+                              <a:latin typeface="Cambria Math" panose="02040503050406030204" pitchFamily="18" charset="0"/>
+                            </a:rPr>
+                            <m:t>𝑑</m:t>
+                          </m:r>
                           <m:r>
                             <a:rPr lang="pt-BR">
                               <a:solidFill>
                                 <a:srgbClr val="FFFF00"/>
                               </a:solidFill>
-                            </a:rPr>
-                            <m:t>𝑑</m:t>
-                          </m:r>
+                              <a:latin typeface="Cambria Math" panose="02040503050406030204" pitchFamily="18" charset="0"/>
+                            </a:rPr>
+                            <m:t>𝑽</m:t>
+                          </m:r>
+                        </m:num>
+                        <m:den>
                           <m:r>
                             <a:rPr lang="pt-BR">
                               <a:solidFill>
                                 <a:srgbClr val="FFFF00"/>
                               </a:solidFill>
-                            </a:rPr>
-                            <m:t>𝑽</m:t>
-                          </m:r>
-                        </m:num>
-                        <m:den>
-                          <m:r>
-                            <a:rPr lang="pt-BR">
-                              <a:solidFill>
-                                <a:srgbClr val="FFFF00"/>
-                              </a:solidFill>
+                              <a:latin typeface="Cambria Math" panose="02040503050406030204" pitchFamily="18" charset="0"/>
                             </a:rPr>
                             <m:t>𝑑𝑡</m:t>
                           </m:r>
@@ -19710,51 +19959,57 @@
                           <a:solidFill>
                             <a:srgbClr val="FFFF00"/>
                           </a:solidFill>
+                          <a:latin typeface="Cambria Math" panose="02040503050406030204" pitchFamily="18" charset="0"/>
                         </a:rPr>
                         <m:t>=</m:t>
                       </m:r>
                       <m:f>
                         <m:fPr>
                           <m:ctrlPr>
+                            <a:rPr lang="pt-BR" i="1">
+                              <a:solidFill>
+                                <a:srgbClr val="FFFF00"/>
+                              </a:solidFill>
+                              <a:latin typeface="Cambria Math" panose="02040503050406030204" pitchFamily="18" charset="0"/>
+                            </a:rPr>
+                          </m:ctrlPr>
+                        </m:fPr>
+                        <m:num>
+                          <m:r>
                             <a:rPr lang="pt-BR">
                               <a:solidFill>
                                 <a:srgbClr val="FFFF00"/>
                               </a:solidFill>
-                            </a:rPr>
-                          </m:ctrlPr>
-                        </m:fPr>
-                        <m:num>
+                              <a:latin typeface="Cambria Math" panose="02040503050406030204" pitchFamily="18" charset="0"/>
+                            </a:rPr>
+                            <m:t>𝜕</m:t>
+                          </m:r>
                           <m:r>
                             <a:rPr lang="pt-BR">
                               <a:solidFill>
                                 <a:srgbClr val="FFFF00"/>
                               </a:solidFill>
-                            </a:rPr>
-                            <m:t>𝜕</m:t>
-                          </m:r>
+                              <a:latin typeface="Cambria Math" panose="02040503050406030204" pitchFamily="18" charset="0"/>
+                            </a:rPr>
+                            <m:t>𝑽</m:t>
+                          </m:r>
+                        </m:num>
+                        <m:den>
                           <m:r>
                             <a:rPr lang="pt-BR">
                               <a:solidFill>
                                 <a:srgbClr val="FFFF00"/>
                               </a:solidFill>
-                            </a:rPr>
-                            <m:t>𝑽</m:t>
-                          </m:r>
-                        </m:num>
-                        <m:den>
+                              <a:latin typeface="Cambria Math" panose="02040503050406030204" pitchFamily="18" charset="0"/>
+                            </a:rPr>
+                            <m:t>𝜕</m:t>
+                          </m:r>
                           <m:r>
                             <a:rPr lang="pt-BR">
                               <a:solidFill>
                                 <a:srgbClr val="FFFF00"/>
                               </a:solidFill>
-                            </a:rPr>
-                            <m:t>𝜕</m:t>
-                          </m:r>
-                          <m:r>
-                            <a:rPr lang="pt-BR">
-                              <a:solidFill>
-                                <a:srgbClr val="FFFF00"/>
-                              </a:solidFill>
+                              <a:latin typeface="Cambria Math" panose="02040503050406030204" pitchFamily="18" charset="0"/>
                             </a:rPr>
                             <m:t>𝑡</m:t>
                           </m:r>
@@ -19765,16 +20020,18 @@
                           <a:solidFill>
                             <a:srgbClr val="FFFF00"/>
                           </a:solidFill>
+                          <a:latin typeface="Cambria Math" panose="02040503050406030204" pitchFamily="18" charset="0"/>
                         </a:rPr>
                         <m:t>+</m:t>
                       </m:r>
                       <m:d>
                         <m:dPr>
                           <m:ctrlPr>
-                            <a:rPr lang="pt-BR" b="1">
+                            <a:rPr lang="pt-BR" b="1" i="1">
                               <a:solidFill>
                                 <a:srgbClr val="FFFF00"/>
                               </a:solidFill>
+                              <a:latin typeface="Cambria Math" panose="02040503050406030204" pitchFamily="18" charset="0"/>
                             </a:rPr>
                           </m:ctrlPr>
                         </m:dPr>
@@ -19784,6 +20041,7 @@
                               <a:solidFill>
                                 <a:srgbClr val="FFFF00"/>
                               </a:solidFill>
+                              <a:latin typeface="Cambria Math" panose="02040503050406030204" pitchFamily="18" charset="0"/>
                             </a:rPr>
                             <m:t>𝑽</m:t>
                           </m:r>
@@ -19792,6 +20050,7 @@
                               <a:solidFill>
                                 <a:srgbClr val="FFFF00"/>
                               </a:solidFill>
+                              <a:latin typeface="Cambria Math" panose="02040503050406030204" pitchFamily="18" charset="0"/>
                               <a:ea typeface="Cambria Math" panose="02040503050406030204" pitchFamily="18" charset="0"/>
                             </a:rPr>
                             <m:t>∙</m:t>
@@ -19801,6 +20060,7 @@
                               <a:solidFill>
                                 <a:srgbClr val="FFFF00"/>
                               </a:solidFill>
+                              <a:latin typeface="Cambria Math" panose="02040503050406030204" pitchFamily="18" charset="0"/>
                               <a:ea typeface="Cambria Math" panose="02040503050406030204" pitchFamily="18" charset="0"/>
                             </a:rPr>
                             <m:t>𝜵</m:t>
@@ -19812,6 +20072,7 @@
                           <a:solidFill>
                             <a:srgbClr val="FFFF00"/>
                           </a:solidFill>
+                          <a:latin typeface="Cambria Math" panose="02040503050406030204" pitchFamily="18" charset="0"/>
                         </a:rPr>
                         <m:t>𝑽</m:t>
                       </m:r>
@@ -19827,7 +20088,7 @@
             </p:txBody>
           </p:sp>
         </mc:Choice>
-        <mc:Fallback>
+        <mc:Fallback xmlns="">
           <p:sp>
             <p:nvSpPr>
               <p:cNvPr id="21" name="CaixaDeTexto 20">
@@ -20146,8 +20407,8 @@
           </a:p>
         </p:txBody>
       </p:sp>
-      <mc:AlternateContent xmlns:mc="http://schemas.openxmlformats.org/markup-compatibility/2006">
-        <mc:Choice xmlns:a14="http://schemas.microsoft.com/office/drawing/2010/main" Requires="a14">
+      <mc:AlternateContent xmlns:mc="http://schemas.openxmlformats.org/markup-compatibility/2006" xmlns:a14="http://schemas.microsoft.com/office/drawing/2010/main">
+        <mc:Choice Requires="a14">
           <p:sp>
             <p:nvSpPr>
               <p:cNvPr id="3" name="Espaço Reservado para Conteúdo 2">
@@ -20487,7 +20748,7 @@
             </p:txBody>
           </p:sp>
         </mc:Choice>
-        <mc:Fallback>
+        <mc:Fallback xmlns="">
           <p:sp>
             <p:nvSpPr>
               <p:cNvPr id="3" name="Espaço Reservado para Conteúdo 2">
@@ -20555,7 +20816,7 @@
             <a:pPr rtl="0"/>
             <a:fld id="{808435AE-0E0F-4D16-9805-53AFBC9B041E}" type="datetime1">
               <a:rPr lang="pt-BR" smtClean="0"/>
-              <a:t>12/02/2022</a:t>
+              <a:t>26/02/2022</a:t>
             </a:fld>
             <a:endParaRPr lang="en-US" dirty="0"/>
           </a:p>
@@ -20688,8 +20949,8 @@
           </a:p>
         </p:txBody>
       </p:sp>
-      <mc:AlternateContent xmlns:mc="http://schemas.openxmlformats.org/markup-compatibility/2006">
-        <mc:Choice xmlns:a14="http://schemas.microsoft.com/office/drawing/2010/main" Requires="a14">
+      <mc:AlternateContent xmlns:mc="http://schemas.openxmlformats.org/markup-compatibility/2006" xmlns:a14="http://schemas.microsoft.com/office/drawing/2010/main">
+        <mc:Choice Requires="a14">
           <p:sp>
             <p:nvSpPr>
               <p:cNvPr id="3" name="Espaço Reservado para Conteúdo 2">
@@ -20889,7 +21150,7 @@
             </p:txBody>
           </p:sp>
         </mc:Choice>
-        <mc:Fallback>
+        <mc:Fallback xmlns="">
           <p:sp>
             <p:nvSpPr>
               <p:cNvPr id="3" name="Espaço Reservado para Conteúdo 2">
@@ -20957,7 +21218,7 @@
             <a:pPr rtl="0"/>
             <a:fld id="{808435AE-0E0F-4D16-9805-53AFBC9B041E}" type="datetime1">
               <a:rPr lang="pt-BR" smtClean="0"/>
-              <a:t>12/02/2022</a:t>
+              <a:t>26/02/2022</a:t>
             </a:fld>
             <a:endParaRPr lang="en-US" dirty="0"/>
           </a:p>
@@ -21023,8 +21284,8 @@
           </a:p>
         </p:txBody>
       </p:sp>
-      <mc:AlternateContent xmlns:mc="http://schemas.openxmlformats.org/markup-compatibility/2006">
-        <mc:Choice xmlns:a14="http://schemas.microsoft.com/office/drawing/2010/main" Requires="a14">
+      <mc:AlternateContent xmlns:mc="http://schemas.openxmlformats.org/markup-compatibility/2006" xmlns:a14="http://schemas.microsoft.com/office/drawing/2010/main">
+        <mc:Choice Requires="a14">
           <p:sp>
             <p:nvSpPr>
               <p:cNvPr id="7" name="CaixaDeTexto 6">
@@ -21100,16 +21361,21 @@
                       <m:f>
                         <m:fPr>
                           <m:ctrlPr>
-                            <a:rPr lang="pt-BR"/>
+                            <a:rPr lang="pt-BR" i="1">
+                              <a:latin typeface="Cambria Math" panose="02040503050406030204" pitchFamily="18" charset="0"/>
+                            </a:rPr>
                           </m:ctrlPr>
                         </m:fPr>
                         <m:num>
                           <m:r>
-                            <a:rPr lang="pt-BR"/>
+                            <a:rPr lang="pt-BR">
+                              <a:latin typeface="Cambria Math" panose="02040503050406030204" pitchFamily="18" charset="0"/>
+                            </a:rPr>
                             <m:t>𝑑</m:t>
                           </m:r>
                           <m:r>
                             <a:rPr lang="pt-BR" i="1" smtClean="0">
+                              <a:latin typeface="Cambria Math" panose="02040503050406030204" pitchFamily="18" charset="0"/>
                               <a:ea typeface="Cambria Math" panose="02040503050406030204" pitchFamily="18" charset="0"/>
                             </a:rPr>
                             <m:t>𝜙</m:t>
@@ -21117,28 +21383,37 @@
                         </m:num>
                         <m:den>
                           <m:r>
-                            <a:rPr lang="pt-BR"/>
+                            <a:rPr lang="pt-BR">
+                              <a:latin typeface="Cambria Math" panose="02040503050406030204" pitchFamily="18" charset="0"/>
+                            </a:rPr>
                             <m:t>𝑑𝑡</m:t>
                           </m:r>
                         </m:den>
                       </m:f>
                       <m:r>
-                        <a:rPr lang="pt-BR"/>
+                        <a:rPr lang="pt-BR">
+                          <a:latin typeface="Cambria Math" panose="02040503050406030204" pitchFamily="18" charset="0"/>
+                        </a:rPr>
                         <m:t>=</m:t>
                       </m:r>
                       <m:f>
                         <m:fPr>
                           <m:ctrlPr>
-                            <a:rPr lang="pt-BR"/>
+                            <a:rPr lang="pt-BR" i="1">
+                              <a:latin typeface="Cambria Math" panose="02040503050406030204" pitchFamily="18" charset="0"/>
+                            </a:rPr>
                           </m:ctrlPr>
                         </m:fPr>
                         <m:num>
                           <m:r>
-                            <a:rPr lang="pt-BR"/>
+                            <a:rPr lang="pt-BR">
+                              <a:latin typeface="Cambria Math" panose="02040503050406030204" pitchFamily="18" charset="0"/>
+                            </a:rPr>
                             <m:t>𝜕</m:t>
                           </m:r>
                           <m:r>
                             <a:rPr lang="pt-BR" i="1" smtClean="0">
+                              <a:latin typeface="Cambria Math" panose="02040503050406030204" pitchFamily="18" charset="0"/>
                               <a:ea typeface="Cambria Math" panose="02040503050406030204" pitchFamily="18" charset="0"/>
                             </a:rPr>
                             <m:t>𝜙</m:t>
@@ -21146,43 +21421,58 @@
                         </m:num>
                         <m:den>
                           <m:r>
-                            <a:rPr lang="pt-BR"/>
+                            <a:rPr lang="pt-BR">
+                              <a:latin typeface="Cambria Math" panose="02040503050406030204" pitchFamily="18" charset="0"/>
+                            </a:rPr>
                             <m:t>𝜕</m:t>
                           </m:r>
                           <m:r>
-                            <a:rPr lang="pt-BR"/>
+                            <a:rPr lang="pt-BR">
+                              <a:latin typeface="Cambria Math" panose="02040503050406030204" pitchFamily="18" charset="0"/>
+                            </a:rPr>
                             <m:t>𝑡</m:t>
                           </m:r>
                         </m:den>
                       </m:f>
                       <m:r>
-                        <a:rPr lang="pt-BR"/>
+                        <a:rPr lang="pt-BR">
+                          <a:latin typeface="Cambria Math" panose="02040503050406030204" pitchFamily="18" charset="0"/>
+                        </a:rPr>
                         <m:t>+</m:t>
                       </m:r>
                       <m:d>
                         <m:dPr>
                           <m:ctrlPr>
-                            <a:rPr lang="pt-BR"/>
+                            <a:rPr lang="pt-BR" i="1">
+                              <a:latin typeface="Cambria Math" panose="02040503050406030204" pitchFamily="18" charset="0"/>
+                            </a:rPr>
                           </m:ctrlPr>
                         </m:dPr>
                         <m:e>
                           <m:r>
-                            <a:rPr lang="pt-BR"/>
+                            <a:rPr lang="pt-BR">
+                              <a:latin typeface="Cambria Math" panose="02040503050406030204" pitchFamily="18" charset="0"/>
+                            </a:rPr>
                             <m:t>𝑢</m:t>
                           </m:r>
                           <m:f>
                             <m:fPr>
                               <m:ctrlPr>
-                                <a:rPr lang="pt-BR"/>
+                                <a:rPr lang="pt-BR" i="1">
+                                  <a:latin typeface="Cambria Math" panose="02040503050406030204" pitchFamily="18" charset="0"/>
+                                </a:rPr>
                               </m:ctrlPr>
                             </m:fPr>
                             <m:num>
                               <m:r>
-                                <a:rPr lang="pt-BR"/>
+                                <a:rPr lang="pt-BR">
+                                  <a:latin typeface="Cambria Math" panose="02040503050406030204" pitchFamily="18" charset="0"/>
+                                </a:rPr>
                                 <m:t>𝜕</m:t>
                               </m:r>
                               <m:r>
                                 <a:rPr lang="pt-BR" i="1" smtClean="0">
+                                  <a:latin typeface="Cambria Math" panose="02040503050406030204" pitchFamily="18" charset="0"/>
                                   <a:ea typeface="Cambria Math" panose="02040503050406030204" pitchFamily="18" charset="0"/>
                                 </a:rPr>
                                 <m:t>𝜙</m:t>
@@ -21190,36 +21480,49 @@
                             </m:num>
                             <m:den>
                               <m:r>
-                                <a:rPr lang="pt-BR"/>
+                                <a:rPr lang="pt-BR">
+                                  <a:latin typeface="Cambria Math" panose="02040503050406030204" pitchFamily="18" charset="0"/>
+                                </a:rPr>
                                 <m:t>𝜕</m:t>
                               </m:r>
                               <m:r>
-                                <a:rPr lang="pt-BR"/>
+                                <a:rPr lang="pt-BR">
+                                  <a:latin typeface="Cambria Math" panose="02040503050406030204" pitchFamily="18" charset="0"/>
+                                </a:rPr>
                                 <m:t>𝑥</m:t>
                               </m:r>
                             </m:den>
                           </m:f>
                           <m:r>
-                            <a:rPr lang="pt-BR"/>
+                            <a:rPr lang="pt-BR">
+                              <a:latin typeface="Cambria Math" panose="02040503050406030204" pitchFamily="18" charset="0"/>
+                            </a:rPr>
                             <m:t>+</m:t>
                           </m:r>
                           <m:r>
-                            <a:rPr lang="pt-BR"/>
+                            <a:rPr lang="pt-BR">
+                              <a:latin typeface="Cambria Math" panose="02040503050406030204" pitchFamily="18" charset="0"/>
+                            </a:rPr>
                             <m:t>𝑣</m:t>
                           </m:r>
                           <m:f>
                             <m:fPr>
                               <m:ctrlPr>
-                                <a:rPr lang="pt-BR"/>
+                                <a:rPr lang="pt-BR" i="1">
+                                  <a:latin typeface="Cambria Math" panose="02040503050406030204" pitchFamily="18" charset="0"/>
+                                </a:rPr>
                               </m:ctrlPr>
                             </m:fPr>
                             <m:num>
                               <m:r>
-                                <a:rPr lang="pt-BR"/>
+                                <a:rPr lang="pt-BR">
+                                  <a:latin typeface="Cambria Math" panose="02040503050406030204" pitchFamily="18" charset="0"/>
+                                </a:rPr>
                                 <m:t>𝜕</m:t>
                               </m:r>
                               <m:r>
                                 <a:rPr lang="pt-BR" i="1" smtClean="0">
+                                  <a:latin typeface="Cambria Math" panose="02040503050406030204" pitchFamily="18" charset="0"/>
                                   <a:ea typeface="Cambria Math" panose="02040503050406030204" pitchFamily="18" charset="0"/>
                                 </a:rPr>
                                 <m:t>𝜙</m:t>
@@ -21227,36 +21530,49 @@
                             </m:num>
                             <m:den>
                               <m:r>
-                                <a:rPr lang="pt-BR"/>
+                                <a:rPr lang="pt-BR">
+                                  <a:latin typeface="Cambria Math" panose="02040503050406030204" pitchFamily="18" charset="0"/>
+                                </a:rPr>
                                 <m:t>𝜕</m:t>
                               </m:r>
                               <m:r>
-                                <a:rPr lang="pt-BR"/>
+                                <a:rPr lang="pt-BR">
+                                  <a:latin typeface="Cambria Math" panose="02040503050406030204" pitchFamily="18" charset="0"/>
+                                </a:rPr>
                                 <m:t>𝑦</m:t>
                               </m:r>
                             </m:den>
                           </m:f>
                           <m:r>
-                            <a:rPr lang="pt-BR"/>
+                            <a:rPr lang="pt-BR">
+                              <a:latin typeface="Cambria Math" panose="02040503050406030204" pitchFamily="18" charset="0"/>
+                            </a:rPr>
                             <m:t>+</m:t>
                           </m:r>
                           <m:r>
-                            <a:rPr lang="pt-BR"/>
+                            <a:rPr lang="pt-BR">
+                              <a:latin typeface="Cambria Math" panose="02040503050406030204" pitchFamily="18" charset="0"/>
+                            </a:rPr>
                             <m:t>𝑤</m:t>
                           </m:r>
                           <m:f>
                             <m:fPr>
                               <m:ctrlPr>
-                                <a:rPr lang="pt-BR"/>
+                                <a:rPr lang="pt-BR" i="1">
+                                  <a:latin typeface="Cambria Math" panose="02040503050406030204" pitchFamily="18" charset="0"/>
+                                </a:rPr>
                               </m:ctrlPr>
                             </m:fPr>
                             <m:num>
                               <m:r>
-                                <a:rPr lang="pt-BR"/>
+                                <a:rPr lang="pt-BR">
+                                  <a:latin typeface="Cambria Math" panose="02040503050406030204" pitchFamily="18" charset="0"/>
+                                </a:rPr>
                                 <m:t>𝜕</m:t>
                               </m:r>
                               <m:r>
                                 <a:rPr lang="pt-BR" i="1" smtClean="0">
+                                  <a:latin typeface="Cambria Math" panose="02040503050406030204" pitchFamily="18" charset="0"/>
                                   <a:ea typeface="Cambria Math" panose="02040503050406030204" pitchFamily="18" charset="0"/>
                                 </a:rPr>
                                 <m:t>𝜙</m:t>
@@ -21264,11 +21580,15 @@
                             </m:num>
                             <m:den>
                               <m:r>
-                                <a:rPr lang="pt-BR"/>
+                                <a:rPr lang="pt-BR">
+                                  <a:latin typeface="Cambria Math" panose="02040503050406030204" pitchFamily="18" charset="0"/>
+                                </a:rPr>
                                 <m:t>𝜕</m:t>
                               </m:r>
                               <m:r>
-                                <a:rPr lang="pt-BR"/>
+                                <a:rPr lang="pt-BR">
+                                  <a:latin typeface="Cambria Math" panose="02040503050406030204" pitchFamily="18" charset="0"/>
+                                </a:rPr>
                                 <m:t>𝑧</m:t>
                               </m:r>
                             </m:den>
@@ -21283,7 +21603,7 @@
             </p:txBody>
           </p:sp>
         </mc:Choice>
-        <mc:Fallback>
+        <mc:Fallback xmlns="">
           <p:sp>
             <p:nvSpPr>
               <p:cNvPr id="7" name="CaixaDeTexto 6">
@@ -21338,8 +21658,8 @@
           </p:sp>
         </mc:Fallback>
       </mc:AlternateContent>
-      <mc:AlternateContent xmlns:mc="http://schemas.openxmlformats.org/markup-compatibility/2006">
-        <mc:Choice xmlns:a14="http://schemas.microsoft.com/office/drawing/2010/main" Requires="a14">
+      <mc:AlternateContent xmlns:mc="http://schemas.openxmlformats.org/markup-compatibility/2006" xmlns:a14="http://schemas.microsoft.com/office/drawing/2010/main">
+        <mc:Choice Requires="a14">
           <p:sp>
             <p:nvSpPr>
               <p:cNvPr id="8" name="CaixaDeTexto 7">
@@ -21415,38 +21735,42 @@
                       <m:f>
                         <m:fPr>
                           <m:ctrlPr>
+                            <a:rPr lang="pt-BR" i="1">
+                              <a:solidFill>
+                                <a:srgbClr val="FFFF00"/>
+                              </a:solidFill>
+                              <a:latin typeface="Cambria Math" panose="02040503050406030204" pitchFamily="18" charset="0"/>
+                            </a:rPr>
+                          </m:ctrlPr>
+                        </m:fPr>
+                        <m:num>
+                          <m:r>
                             <a:rPr lang="pt-BR">
                               <a:solidFill>
                                 <a:srgbClr val="FFFF00"/>
                               </a:solidFill>
-                            </a:rPr>
-                          </m:ctrlPr>
-                        </m:fPr>
-                        <m:num>
+                              <a:latin typeface="Cambria Math" panose="02040503050406030204" pitchFamily="18" charset="0"/>
+                            </a:rPr>
+                            <m:t>𝑑</m:t>
+                          </m:r>
+                          <m:r>
+                            <a:rPr lang="pt-BR" i="1" smtClean="0">
+                              <a:solidFill>
+                                <a:srgbClr val="FFFF00"/>
+                              </a:solidFill>
+                              <a:latin typeface="Cambria Math" panose="02040503050406030204" pitchFamily="18" charset="0"/>
+                              <a:ea typeface="Cambria Math" panose="02040503050406030204" pitchFamily="18" charset="0"/>
+                            </a:rPr>
+                            <m:t>𝜙</m:t>
+                          </m:r>
+                        </m:num>
+                        <m:den>
                           <m:r>
                             <a:rPr lang="pt-BR">
                               <a:solidFill>
                                 <a:srgbClr val="FFFF00"/>
                               </a:solidFill>
-                            </a:rPr>
-                            <m:t>𝑑</m:t>
-                          </m:r>
-                          <m:r>
-                            <a:rPr lang="pt-BR" i="1" smtClean="0">
-                              <a:solidFill>
-                                <a:srgbClr val="FFFF00"/>
-                              </a:solidFill>
-                              <a:ea typeface="Cambria Math" panose="02040503050406030204" pitchFamily="18" charset="0"/>
-                            </a:rPr>
-                            <m:t>𝜙</m:t>
-                          </m:r>
-                        </m:num>
-                        <m:den>
-                          <m:r>
-                            <a:rPr lang="pt-BR">
-                              <a:solidFill>
-                                <a:srgbClr val="FFFF00"/>
-                              </a:solidFill>
+                              <a:latin typeface="Cambria Math" panose="02040503050406030204" pitchFamily="18" charset="0"/>
                             </a:rPr>
                             <m:t>𝑑𝑡</m:t>
                           </m:r>
@@ -21457,52 +21781,58 @@
                           <a:solidFill>
                             <a:srgbClr val="FFFF00"/>
                           </a:solidFill>
+                          <a:latin typeface="Cambria Math" panose="02040503050406030204" pitchFamily="18" charset="0"/>
                         </a:rPr>
                         <m:t>=</m:t>
                       </m:r>
                       <m:f>
                         <m:fPr>
                           <m:ctrlPr>
+                            <a:rPr lang="pt-BR" i="1">
+                              <a:solidFill>
+                                <a:srgbClr val="FFFF00"/>
+                              </a:solidFill>
+                              <a:latin typeface="Cambria Math" panose="02040503050406030204" pitchFamily="18" charset="0"/>
+                            </a:rPr>
+                          </m:ctrlPr>
+                        </m:fPr>
+                        <m:num>
+                          <m:r>
                             <a:rPr lang="pt-BR">
                               <a:solidFill>
                                 <a:srgbClr val="FFFF00"/>
                               </a:solidFill>
-                            </a:rPr>
-                          </m:ctrlPr>
-                        </m:fPr>
-                        <m:num>
+                              <a:latin typeface="Cambria Math" panose="02040503050406030204" pitchFamily="18" charset="0"/>
+                            </a:rPr>
+                            <m:t>𝜕</m:t>
+                          </m:r>
+                          <m:r>
+                            <a:rPr lang="pt-BR" i="1" smtClean="0">
+                              <a:solidFill>
+                                <a:srgbClr val="FFFF00"/>
+                              </a:solidFill>
+                              <a:latin typeface="Cambria Math" panose="02040503050406030204" pitchFamily="18" charset="0"/>
+                              <a:ea typeface="Cambria Math" panose="02040503050406030204" pitchFamily="18" charset="0"/>
+                            </a:rPr>
+                            <m:t>𝜙</m:t>
+                          </m:r>
+                        </m:num>
+                        <m:den>
                           <m:r>
                             <a:rPr lang="pt-BR">
                               <a:solidFill>
                                 <a:srgbClr val="FFFF00"/>
                               </a:solidFill>
+                              <a:latin typeface="Cambria Math" panose="02040503050406030204" pitchFamily="18" charset="0"/>
                             </a:rPr>
                             <m:t>𝜕</m:t>
                           </m:r>
-                          <m:r>
-                            <a:rPr lang="pt-BR" i="1" smtClean="0">
-                              <a:solidFill>
-                                <a:srgbClr val="FFFF00"/>
-                              </a:solidFill>
-                              <a:ea typeface="Cambria Math" panose="02040503050406030204" pitchFamily="18" charset="0"/>
-                            </a:rPr>
-                            <m:t>𝜙</m:t>
-                          </m:r>
-                        </m:num>
-                        <m:den>
                           <m:r>
                             <a:rPr lang="pt-BR">
                               <a:solidFill>
                                 <a:srgbClr val="FFFF00"/>
                               </a:solidFill>
-                            </a:rPr>
-                            <m:t>𝜕</m:t>
-                          </m:r>
-                          <m:r>
-                            <a:rPr lang="pt-BR">
-                              <a:solidFill>
-                                <a:srgbClr val="FFFF00"/>
-                              </a:solidFill>
+                              <a:latin typeface="Cambria Math" panose="02040503050406030204" pitchFamily="18" charset="0"/>
                             </a:rPr>
                             <m:t>𝑡</m:t>
                           </m:r>
@@ -21513,16 +21843,18 @@
                           <a:solidFill>
                             <a:srgbClr val="FFFF00"/>
                           </a:solidFill>
+                          <a:latin typeface="Cambria Math" panose="02040503050406030204" pitchFamily="18" charset="0"/>
                         </a:rPr>
                         <m:t>+</m:t>
                       </m:r>
                       <m:d>
                         <m:dPr>
                           <m:ctrlPr>
-                            <a:rPr lang="pt-BR" b="1">
+                            <a:rPr lang="pt-BR" b="1" i="1">
                               <a:solidFill>
                                 <a:srgbClr val="FFFF00"/>
                               </a:solidFill>
+                              <a:latin typeface="Cambria Math" panose="02040503050406030204" pitchFamily="18" charset="0"/>
                             </a:rPr>
                           </m:ctrlPr>
                         </m:dPr>
@@ -21532,6 +21864,7 @@
                               <a:solidFill>
                                 <a:srgbClr val="FFFF00"/>
                               </a:solidFill>
+                              <a:latin typeface="Cambria Math" panose="02040503050406030204" pitchFamily="18" charset="0"/>
                             </a:rPr>
                             <m:t>𝑽</m:t>
                           </m:r>
@@ -21540,6 +21873,7 @@
                               <a:solidFill>
                                 <a:srgbClr val="FFFF00"/>
                               </a:solidFill>
+                              <a:latin typeface="Cambria Math" panose="02040503050406030204" pitchFamily="18" charset="0"/>
                               <a:ea typeface="Cambria Math" panose="02040503050406030204" pitchFamily="18" charset="0"/>
                             </a:rPr>
                             <m:t>∙</m:t>
@@ -21549,6 +21883,7 @@
                               <a:solidFill>
                                 <a:srgbClr val="FFFF00"/>
                               </a:solidFill>
+                              <a:latin typeface="Cambria Math" panose="02040503050406030204" pitchFamily="18" charset="0"/>
                               <a:ea typeface="Cambria Math" panose="02040503050406030204" pitchFamily="18" charset="0"/>
                             </a:rPr>
                             <m:t>𝜵</m:t>
@@ -21560,6 +21895,7 @@
                           <a:solidFill>
                             <a:srgbClr val="FFFF00"/>
                           </a:solidFill>
+                          <a:latin typeface="Cambria Math" panose="02040503050406030204" pitchFamily="18" charset="0"/>
                           <a:ea typeface="Cambria Math" panose="02040503050406030204" pitchFamily="18" charset="0"/>
                         </a:rPr>
                         <m:t>𝝓</m:t>
@@ -21576,7 +21912,7 @@
             </p:txBody>
           </p:sp>
         </mc:Choice>
-        <mc:Fallback>
+        <mc:Fallback xmlns="">
           <p:sp>
             <p:nvSpPr>
               <p:cNvPr id="8" name="CaixaDeTexto 7">
@@ -21631,8 +21967,8 @@
           </p:sp>
         </mc:Fallback>
       </mc:AlternateContent>
-      <mc:AlternateContent xmlns:mc="http://schemas.openxmlformats.org/markup-compatibility/2006">
-        <mc:Choice xmlns:a14="http://schemas.microsoft.com/office/drawing/2010/main" Requires="a14">
+      <mc:AlternateContent xmlns:mc="http://schemas.openxmlformats.org/markup-compatibility/2006" xmlns:a14="http://schemas.microsoft.com/office/drawing/2010/main">
+        <mc:Choice Requires="a14">
           <p:sp>
             <p:nvSpPr>
               <p:cNvPr id="9" name="CaixaDeTexto 8">
@@ -21722,6 +22058,7 @@
                           </m:r>
                           <m:r>
                             <a:rPr lang="pt-BR" sz="2400" b="0" i="1" smtClean="0">
+                              <a:latin typeface="Cambria Math" panose="02040503050406030204" pitchFamily="18" charset="0"/>
                               <a:ea typeface="Cambria Math" panose="02040503050406030204" pitchFamily="18" charset="0"/>
                             </a:rPr>
                             <m:t>𝜙</m:t>
@@ -21759,6 +22096,7 @@
                           </m:r>
                           <m:r>
                             <a:rPr lang="pt-BR" sz="2400" b="0" i="1" smtClean="0">
+                              <a:latin typeface="Cambria Math" panose="02040503050406030204" pitchFamily="18" charset="0"/>
                               <a:ea typeface="Cambria Math" panose="02040503050406030204" pitchFamily="18" charset="0"/>
                             </a:rPr>
                             <m:t>𝜙</m:t>
@@ -21802,6 +22140,7 @@
                           </m:r>
                           <m:r>
                             <a:rPr lang="pt-BR" sz="2400" b="0" i="1" smtClean="0">
+                              <a:latin typeface="Cambria Math" panose="02040503050406030204" pitchFamily="18" charset="0"/>
                               <a:ea typeface="Cambria Math" panose="02040503050406030204" pitchFamily="18" charset="0"/>
                             </a:rPr>
                             <m:t>𝜙</m:t>
@@ -21856,16 +22195,21 @@
                       <m:f>
                         <m:fPr>
                           <m:ctrlPr>
-                            <a:rPr lang="pt-BR" sz="2400"/>
+                            <a:rPr lang="pt-BR" sz="2400" i="1">
+                              <a:latin typeface="Cambria Math" panose="02040503050406030204" pitchFamily="18" charset="0"/>
+                            </a:rPr>
                           </m:ctrlPr>
                         </m:fPr>
                         <m:num>
                           <m:r>
-                            <a:rPr lang="pt-BR" sz="2400"/>
+                            <a:rPr lang="pt-BR" sz="2400">
+                              <a:latin typeface="Cambria Math" panose="02040503050406030204" pitchFamily="18" charset="0"/>
+                            </a:rPr>
                             <m:t>𝜕</m:t>
                           </m:r>
                           <m:r>
                             <a:rPr lang="pt-BR" sz="2400" i="1" smtClean="0">
+                              <a:latin typeface="Cambria Math" panose="02040503050406030204" pitchFamily="18" charset="0"/>
                               <a:ea typeface="Cambria Math" panose="02040503050406030204" pitchFamily="18" charset="0"/>
                             </a:rPr>
                             <m:t>𝜙</m:t>
@@ -21873,7 +22217,9 @@
                         </m:num>
                         <m:den>
                           <m:r>
-                            <a:rPr lang="pt-BR" sz="2400"/>
+                            <a:rPr lang="pt-BR" sz="2400">
+                              <a:latin typeface="Cambria Math" panose="02040503050406030204" pitchFamily="18" charset="0"/>
+                            </a:rPr>
                             <m:t>𝜕</m:t>
                           </m:r>
                           <m:r>
@@ -21887,12 +22233,16 @@
                       <m:f>
                         <m:fPr>
                           <m:ctrlPr>
-                            <a:rPr lang="pt-BR" sz="2400"/>
+                            <a:rPr lang="pt-BR" sz="2400" i="1">
+                              <a:latin typeface="Cambria Math" panose="02040503050406030204" pitchFamily="18" charset="0"/>
+                            </a:rPr>
                           </m:ctrlPr>
                         </m:fPr>
                         <m:num>
                           <m:r>
-                            <a:rPr lang="pt-BR" sz="2400"/>
+                            <a:rPr lang="pt-BR" sz="2400">
+                              <a:latin typeface="Cambria Math" panose="02040503050406030204" pitchFamily="18" charset="0"/>
+                            </a:rPr>
                             <m:t>𝑑</m:t>
                           </m:r>
                           <m:r>
@@ -21904,28 +22254,37 @@
                         </m:num>
                         <m:den>
                           <m:r>
-                            <a:rPr lang="pt-BR" sz="2400"/>
+                            <a:rPr lang="pt-BR" sz="2400">
+                              <a:latin typeface="Cambria Math" panose="02040503050406030204" pitchFamily="18" charset="0"/>
+                            </a:rPr>
                             <m:t>𝑑𝑡</m:t>
                           </m:r>
                         </m:den>
                       </m:f>
                       <m:r>
-                        <a:rPr lang="pt-BR" sz="2400"/>
+                        <a:rPr lang="pt-BR" sz="2400">
+                          <a:latin typeface="Cambria Math" panose="02040503050406030204" pitchFamily="18" charset="0"/>
+                        </a:rPr>
                         <m:t>+</m:t>
                       </m:r>
                       <m:f>
                         <m:fPr>
                           <m:ctrlPr>
-                            <a:rPr lang="pt-BR" sz="2400"/>
+                            <a:rPr lang="pt-BR" sz="2400" i="1">
+                              <a:latin typeface="Cambria Math" panose="02040503050406030204" pitchFamily="18" charset="0"/>
+                            </a:rPr>
                           </m:ctrlPr>
                         </m:fPr>
                         <m:num>
                           <m:r>
-                            <a:rPr lang="pt-BR" sz="2400"/>
+                            <a:rPr lang="pt-BR" sz="2400">
+                              <a:latin typeface="Cambria Math" panose="02040503050406030204" pitchFamily="18" charset="0"/>
+                            </a:rPr>
                             <m:t>𝜕</m:t>
                           </m:r>
                           <m:r>
                             <a:rPr lang="pt-BR" sz="2400" i="1" smtClean="0">
+                              <a:latin typeface="Cambria Math" panose="02040503050406030204" pitchFamily="18" charset="0"/>
                               <a:ea typeface="Cambria Math" panose="02040503050406030204" pitchFamily="18" charset="0"/>
                             </a:rPr>
                             <m:t>𝜙</m:t>
@@ -21933,7 +22292,9 @@
                         </m:num>
                         <m:den>
                           <m:r>
-                            <a:rPr lang="pt-BR" sz="2400"/>
+                            <a:rPr lang="pt-BR" sz="2400">
+                              <a:latin typeface="Cambria Math" panose="02040503050406030204" pitchFamily="18" charset="0"/>
+                            </a:rPr>
                             <m:t>𝜕</m:t>
                           </m:r>
                           <m:r>
@@ -21947,12 +22308,16 @@
                       <m:f>
                         <m:fPr>
                           <m:ctrlPr>
-                            <a:rPr lang="pt-BR" sz="2400"/>
+                            <a:rPr lang="pt-BR" sz="2400" i="1">
+                              <a:latin typeface="Cambria Math" panose="02040503050406030204" pitchFamily="18" charset="0"/>
+                            </a:rPr>
                           </m:ctrlPr>
                         </m:fPr>
                         <m:num>
                           <m:r>
-                            <a:rPr lang="pt-BR" sz="2400"/>
+                            <a:rPr lang="pt-BR" sz="2400">
+                              <a:latin typeface="Cambria Math" panose="02040503050406030204" pitchFamily="18" charset="0"/>
+                            </a:rPr>
                             <m:t>𝑑</m:t>
                           </m:r>
                           <m:r>
@@ -21964,7 +22329,9 @@
                         </m:num>
                         <m:den>
                           <m:r>
-                            <a:rPr lang="pt-BR" sz="2400"/>
+                            <a:rPr lang="pt-BR" sz="2400">
+                              <a:latin typeface="Cambria Math" panose="02040503050406030204" pitchFamily="18" charset="0"/>
+                            </a:rPr>
                             <m:t>𝑑𝑡</m:t>
                           </m:r>
                         </m:den>
@@ -21977,7 +22344,7 @@
             </p:txBody>
           </p:sp>
         </mc:Choice>
-        <mc:Fallback>
+        <mc:Fallback xmlns="">
           <p:sp>
             <p:nvSpPr>
               <p:cNvPr id="9" name="CaixaDeTexto 8">
@@ -22464,7 +22831,7 @@
             <a:pPr rtl="0"/>
             <a:fld id="{6095332E-CEC1-48BB-AC13-CCF7C10DDD05}" type="datetime1">
               <a:rPr lang="pt-BR" smtClean="0"/>
-              <a:t>12/02/2022</a:t>
+              <a:t>26/02/2022</a:t>
             </a:fld>
             <a:endParaRPr lang="en-US" dirty="0"/>
           </a:p>
@@ -22650,7 +23017,11 @@
               </a:lnSpc>
             </a:pPr>
             <a:r>
-              <a:rPr lang="pt-BR" dirty="0"/>
+              <a:rPr lang="pt-BR" dirty="0">
+                <a:solidFill>
+                  <a:srgbClr val="FF0000"/>
+                </a:solidFill>
+              </a:rPr>
               <a:t>Equação da conservação da massa</a:t>
             </a:r>
           </a:p>
@@ -22732,7 +23103,7 @@
             <a:pPr rtl="0"/>
             <a:fld id="{21C0F506-B4EE-4E87-B4AA-59B300BD6708}" type="datetime1">
               <a:rPr lang="pt-BR" smtClean="0"/>
-              <a:t>12/02/2022</a:t>
+              <a:t>26/02/2022</a:t>
             </a:fld>
             <a:endParaRPr lang="en-US" dirty="0"/>
           </a:p>
@@ -23017,7 +23388,7 @@
             <a:pPr rtl="0"/>
             <a:fld id="{21C0F506-B4EE-4E87-B4AA-59B300BD6708}" type="datetime1">
               <a:rPr lang="pt-BR" smtClean="0"/>
-              <a:t>12/02/2022</a:t>
+              <a:t>26/02/2022</a:t>
             </a:fld>
             <a:endParaRPr lang="en-US" dirty="0"/>
           </a:p>
@@ -23814,7 +24185,7 @@
             <a:pPr rtl="0"/>
             <a:fld id="{21C0F506-B4EE-4E87-B4AA-59B300BD6708}" type="datetime1">
               <a:rPr lang="pt-BR" smtClean="0"/>
-              <a:t>12/02/2022</a:t>
+              <a:t>26/02/2022</a:t>
             </a:fld>
             <a:endParaRPr lang="en-US" dirty="0"/>
           </a:p>
@@ -24062,7 +24433,7 @@
             <a:pPr rtl="0"/>
             <a:fld id="{808435AE-0E0F-4D16-9805-53AFBC9B041E}" type="datetime1">
               <a:rPr lang="pt-BR" smtClean="0"/>
-              <a:t>12/02/2022</a:t>
+              <a:t>26/02/2022</a:t>
             </a:fld>
             <a:endParaRPr lang="en-US" dirty="0"/>
           </a:p>
@@ -24366,7 +24737,7 @@
             <a:pPr rtl="0"/>
             <a:fld id="{808435AE-0E0F-4D16-9805-53AFBC9B041E}" type="datetime1">
               <a:rPr lang="pt-BR" smtClean="0"/>
-              <a:t>12/02/2022</a:t>
+              <a:t>26/02/2022</a:t>
             </a:fld>
             <a:endParaRPr lang="en-US" dirty="0"/>
           </a:p>
@@ -24903,7 +25274,7 @@
                   <a:spcPts val="600"/>
                 </a:spcAft>
               </a:pPr>
-              <a:t>12/02/2022</a:t>
+              <a:t>26/02/2022</a:t>
             </a:fld>
             <a:endParaRPr lang="en-US" dirty="0"/>
           </a:p>
@@ -25259,7 +25630,7 @@
                   <a:spcPts val="600"/>
                 </a:spcAft>
               </a:pPr>
-              <a:t>12/02/2022</a:t>
+              <a:t>26/02/2022</a:t>
             </a:fld>
             <a:endParaRPr lang="en-US" dirty="0"/>
           </a:p>
@@ -26938,7 +27309,7 @@
             <a:pPr rtl="0"/>
             <a:fld id="{63237813-B0A3-4431-9C44-B25D3B956C2A}" type="datetime1">
               <a:rPr lang="pt-BR" smtClean="0"/>
-              <a:t>12/02/2022</a:t>
+              <a:t>26/02/2022</a:t>
             </a:fld>
             <a:endParaRPr lang="en-US" dirty="0"/>
           </a:p>

</xml_diff>